<commit_message>
update to power point
</commit_message>
<xml_diff>
--- a/Planning and Design/CST-247 Milestone.pptx
+++ b/Planning and Design/CST-247 Milestone.pptx
@@ -7,13 +7,17 @@
   <p:sldIdLst>
     <p:sldId id="256" r:id="rId2"/>
     <p:sldId id="257" r:id="rId3"/>
-    <p:sldId id="258" r:id="rId4"/>
-    <p:sldId id="259" r:id="rId5"/>
-    <p:sldId id="260" r:id="rId6"/>
-    <p:sldId id="261" r:id="rId7"/>
-    <p:sldId id="262" r:id="rId8"/>
-    <p:sldId id="263" r:id="rId9"/>
-    <p:sldId id="264" r:id="rId10"/>
+    <p:sldId id="265" r:id="rId4"/>
+    <p:sldId id="266" r:id="rId5"/>
+    <p:sldId id="268" r:id="rId6"/>
+    <p:sldId id="267" r:id="rId7"/>
+    <p:sldId id="258" r:id="rId8"/>
+    <p:sldId id="259" r:id="rId9"/>
+    <p:sldId id="260" r:id="rId10"/>
+    <p:sldId id="261" r:id="rId11"/>
+    <p:sldId id="262" r:id="rId12"/>
+    <p:sldId id="263" r:id="rId13"/>
+    <p:sldId id="264" r:id="rId14"/>
   </p:sldIdLst>
   <p:sldSz cx="12192000" cy="6858000"/>
   <p:notesSz cx="6858000" cy="9144000"/>
@@ -185,7 +189,7 @@
           <a:noFill/>
           <a:extLst>
             <a:ext uri="{909E8E84-426E-40dd-AFC4-6F175D3DCCD1}">
-              <a14:hiddenFill xmlns="" xmlns:a14="http://schemas.microsoft.com/office/drawing/2010/main">
+              <a14:hiddenFill xmlns:a14="http://schemas.microsoft.com/office/drawing/2010/main" xmlns="">
                 <a:solidFill>
                   <a:srgbClr val="FFFFFF"/>
                 </a:solidFill>
@@ -244,7 +248,7 @@
             </a:ln>
             <a:extLst>
               <a:ext uri="{91240B29-F687-4f45-9708-019B960494DF}">
-                <a14:hiddenLine xmlns="" xmlns:a14="http://schemas.microsoft.com/office/drawing/2010/main" w="9525">
+                <a14:hiddenLine xmlns:a14="http://schemas.microsoft.com/office/drawing/2010/main" xmlns="" w="9525">
                   <a:solidFill>
                     <a:srgbClr val="000000"/>
                   </a:solidFill>
@@ -334,7 +338,7 @@
             </a:ln>
             <a:extLst>
               <a:ext uri="{91240B29-F687-4f45-9708-019B960494DF}">
-                <a14:hiddenLine xmlns="" xmlns:a14="http://schemas.microsoft.com/office/drawing/2010/main" w="9525">
+                <a14:hiddenLine xmlns:a14="http://schemas.microsoft.com/office/drawing/2010/main" xmlns="" w="9525">
                   <a:solidFill>
                     <a:srgbClr val="000000"/>
                   </a:solidFill>
@@ -424,7 +428,7 @@
             </a:ln>
             <a:extLst>
               <a:ext uri="{91240B29-F687-4f45-9708-019B960494DF}">
-                <a14:hiddenLine xmlns="" xmlns:a14="http://schemas.microsoft.com/office/drawing/2010/main" w="9525">
+                <a14:hiddenLine xmlns:a14="http://schemas.microsoft.com/office/drawing/2010/main" xmlns="" w="9525">
                   <a:solidFill>
                     <a:srgbClr val="000000"/>
                   </a:solidFill>
@@ -458,7 +462,7 @@
             </a:ln>
             <a:extLst>
               <a:ext uri="{91240B29-F687-4f45-9708-019B960494DF}">
-                <a14:hiddenLine xmlns="" xmlns:a14="http://schemas.microsoft.com/office/drawing/2010/main" w="9525">
+                <a14:hiddenLine xmlns:a14="http://schemas.microsoft.com/office/drawing/2010/main" xmlns="" w="9525">
                   <a:solidFill>
                     <a:srgbClr val="000000"/>
                   </a:solidFill>
@@ -548,7 +552,7 @@
             </a:ln>
             <a:extLst>
               <a:ext uri="{91240B29-F687-4f45-9708-019B960494DF}">
-                <a14:hiddenLine xmlns="" xmlns:a14="http://schemas.microsoft.com/office/drawing/2010/main" w="9525">
+                <a14:hiddenLine xmlns:a14="http://schemas.microsoft.com/office/drawing/2010/main" xmlns="" w="9525">
                   <a:solidFill>
                     <a:srgbClr val="000000"/>
                   </a:solidFill>
@@ -610,7 +614,7 @@
             </a:ln>
             <a:extLst>
               <a:ext uri="{91240B29-F687-4f45-9708-019B960494DF}">
-                <a14:hiddenLine xmlns="" xmlns:a14="http://schemas.microsoft.com/office/drawing/2010/main" w="9525">
+                <a14:hiddenLine xmlns:a14="http://schemas.microsoft.com/office/drawing/2010/main" xmlns="" w="9525">
                   <a:solidFill>
                     <a:srgbClr val="000000"/>
                   </a:solidFill>
@@ -672,7 +676,7 @@
             </a:ln>
             <a:extLst>
               <a:ext uri="{91240B29-F687-4f45-9708-019B960494DF}">
-                <a14:hiddenLine xmlns="" xmlns:a14="http://schemas.microsoft.com/office/drawing/2010/main" w="9525">
+                <a14:hiddenLine xmlns:a14="http://schemas.microsoft.com/office/drawing/2010/main" xmlns="" w="9525">
                   <a:solidFill>
                     <a:srgbClr val="000000"/>
                   </a:solidFill>
@@ -762,7 +766,7 @@
             </a:ln>
             <a:extLst>
               <a:ext uri="{91240B29-F687-4f45-9708-019B960494DF}">
-                <a14:hiddenLine xmlns="" xmlns:a14="http://schemas.microsoft.com/office/drawing/2010/main" w="9525">
+                <a14:hiddenLine xmlns:a14="http://schemas.microsoft.com/office/drawing/2010/main" xmlns="" w="9525">
                   <a:solidFill>
                     <a:srgbClr val="000000"/>
                   </a:solidFill>
@@ -824,7 +828,7 @@
             </a:ln>
             <a:extLst>
               <a:ext uri="{91240B29-F687-4f45-9708-019B960494DF}">
-                <a14:hiddenLine xmlns="" xmlns:a14="http://schemas.microsoft.com/office/drawing/2010/main" w="9525">
+                <a14:hiddenLine xmlns:a14="http://schemas.microsoft.com/office/drawing/2010/main" xmlns="" w="9525">
                   <a:solidFill>
                     <a:srgbClr val="000000"/>
                   </a:solidFill>
@@ -886,7 +890,7 @@
             </a:ln>
             <a:extLst>
               <a:ext uri="{91240B29-F687-4f45-9708-019B960494DF}">
-                <a14:hiddenLine xmlns="" xmlns:a14="http://schemas.microsoft.com/office/drawing/2010/main" w="9525">
+                <a14:hiddenLine xmlns:a14="http://schemas.microsoft.com/office/drawing/2010/main" xmlns="" w="9525">
                   <a:solidFill>
                     <a:srgbClr val="000000"/>
                   </a:solidFill>
@@ -976,7 +980,7 @@
             </a:ln>
             <a:extLst>
               <a:ext uri="{91240B29-F687-4f45-9708-019B960494DF}">
-                <a14:hiddenLine xmlns="" xmlns:a14="http://schemas.microsoft.com/office/drawing/2010/main" w="9525">
+                <a14:hiddenLine xmlns:a14="http://schemas.microsoft.com/office/drawing/2010/main" xmlns="" w="9525">
                   <a:solidFill>
                     <a:srgbClr val="000000"/>
                   </a:solidFill>
@@ -1066,7 +1070,7 @@
             </a:ln>
             <a:extLst>
               <a:ext uri="{91240B29-F687-4f45-9708-019B960494DF}">
-                <a14:hiddenLine xmlns="" xmlns:a14="http://schemas.microsoft.com/office/drawing/2010/main" w="9525">
+                <a14:hiddenLine xmlns:a14="http://schemas.microsoft.com/office/drawing/2010/main" xmlns="" w="9525">
                   <a:solidFill>
                     <a:srgbClr val="000000"/>
                   </a:solidFill>
@@ -1128,7 +1132,7 @@
             </a:ln>
             <a:extLst>
               <a:ext uri="{91240B29-F687-4f45-9708-019B960494DF}">
-                <a14:hiddenLine xmlns="" xmlns:a14="http://schemas.microsoft.com/office/drawing/2010/main" w="9525">
+                <a14:hiddenLine xmlns:a14="http://schemas.microsoft.com/office/drawing/2010/main" xmlns="" w="9525">
                   <a:solidFill>
                     <a:srgbClr val="000000"/>
                   </a:solidFill>
@@ -1238,7 +1242,7 @@
             </a:ln>
             <a:extLst>
               <a:ext uri="{91240B29-F687-4f45-9708-019B960494DF}">
-                <a14:hiddenLine xmlns="" xmlns:a14="http://schemas.microsoft.com/office/drawing/2010/main" w="9525">
+                <a14:hiddenLine xmlns:a14="http://schemas.microsoft.com/office/drawing/2010/main" xmlns="" w="9525">
                   <a:solidFill>
                     <a:srgbClr val="000000"/>
                   </a:solidFill>
@@ -1300,7 +1304,7 @@
             </a:ln>
             <a:extLst>
               <a:ext uri="{91240B29-F687-4f45-9708-019B960494DF}">
-                <a14:hiddenLine xmlns="" xmlns:a14="http://schemas.microsoft.com/office/drawing/2010/main" w="9525">
+                <a14:hiddenLine xmlns:a14="http://schemas.microsoft.com/office/drawing/2010/main" xmlns="" w="9525">
                   <a:solidFill>
                     <a:srgbClr val="000000"/>
                   </a:solidFill>
@@ -1390,7 +1394,7 @@
             </a:ln>
             <a:extLst>
               <a:ext uri="{91240B29-F687-4f45-9708-019B960494DF}">
-                <a14:hiddenLine xmlns="" xmlns:a14="http://schemas.microsoft.com/office/drawing/2010/main" w="9525">
+                <a14:hiddenLine xmlns:a14="http://schemas.microsoft.com/office/drawing/2010/main" xmlns="" w="9525">
                   <a:solidFill>
                     <a:srgbClr val="000000"/>
                   </a:solidFill>
@@ -1480,7 +1484,7 @@
             </a:ln>
             <a:extLst>
               <a:ext uri="{91240B29-F687-4f45-9708-019B960494DF}">
-                <a14:hiddenLine xmlns="" xmlns:a14="http://schemas.microsoft.com/office/drawing/2010/main" w="9525">
+                <a14:hiddenLine xmlns:a14="http://schemas.microsoft.com/office/drawing/2010/main" xmlns="" w="9525">
                   <a:solidFill>
                     <a:srgbClr val="000000"/>
                   </a:solidFill>
@@ -1542,7 +1546,7 @@
             </a:ln>
             <a:extLst>
               <a:ext uri="{91240B29-F687-4f45-9708-019B960494DF}">
-                <a14:hiddenLine xmlns="" xmlns:a14="http://schemas.microsoft.com/office/drawing/2010/main" w="9525">
+                <a14:hiddenLine xmlns:a14="http://schemas.microsoft.com/office/drawing/2010/main" xmlns="" w="9525">
                   <a:solidFill>
                     <a:srgbClr val="000000"/>
                   </a:solidFill>
@@ -1632,7 +1636,7 @@
             </a:ln>
             <a:extLst>
               <a:ext uri="{91240B29-F687-4f45-9708-019B960494DF}">
-                <a14:hiddenLine xmlns="" xmlns:a14="http://schemas.microsoft.com/office/drawing/2010/main" w="9525">
+                <a14:hiddenLine xmlns:a14="http://schemas.microsoft.com/office/drawing/2010/main" xmlns="" w="9525">
                   <a:solidFill>
                     <a:srgbClr val="000000"/>
                   </a:solidFill>
@@ -1722,7 +1726,7 @@
             </a:ln>
             <a:extLst>
               <a:ext uri="{91240B29-F687-4f45-9708-019B960494DF}">
-                <a14:hiddenLine xmlns="" xmlns:a14="http://schemas.microsoft.com/office/drawing/2010/main" w="9525">
+                <a14:hiddenLine xmlns:a14="http://schemas.microsoft.com/office/drawing/2010/main" xmlns="" w="9525">
                   <a:solidFill>
                     <a:srgbClr val="000000"/>
                   </a:solidFill>
@@ -1778,7 +1782,7 @@
             </a:ln>
             <a:extLst>
               <a:ext uri="{91240B29-F687-4f45-9708-019B960494DF}">
-                <a14:hiddenLine xmlns="" xmlns:a14="http://schemas.microsoft.com/office/drawing/2010/main" w="9525">
+                <a14:hiddenLine xmlns:a14="http://schemas.microsoft.com/office/drawing/2010/main" xmlns="" w="9525">
                   <a:solidFill>
                     <a:srgbClr val="000000"/>
                   </a:solidFill>
@@ -1868,7 +1872,7 @@
             </a:ln>
             <a:extLst>
               <a:ext uri="{91240B29-F687-4f45-9708-019B960494DF}">
-                <a14:hiddenLine xmlns="" xmlns:a14="http://schemas.microsoft.com/office/drawing/2010/main" w="9525">
+                <a14:hiddenLine xmlns:a14="http://schemas.microsoft.com/office/drawing/2010/main" xmlns="" w="9525">
                   <a:solidFill>
                     <a:srgbClr val="000000"/>
                   </a:solidFill>
@@ -1924,7 +1928,7 @@
             </a:ln>
             <a:extLst>
               <a:ext uri="{91240B29-F687-4f45-9708-019B960494DF}">
-                <a14:hiddenLine xmlns="" xmlns:a14="http://schemas.microsoft.com/office/drawing/2010/main" w="9525">
+                <a14:hiddenLine xmlns:a14="http://schemas.microsoft.com/office/drawing/2010/main" xmlns="" w="9525">
                   <a:solidFill>
                     <a:srgbClr val="000000"/>
                   </a:solidFill>
@@ -2014,7 +2018,7 @@
             </a:ln>
             <a:extLst>
               <a:ext uri="{91240B29-F687-4f45-9708-019B960494DF}">
-                <a14:hiddenLine xmlns="" xmlns:a14="http://schemas.microsoft.com/office/drawing/2010/main" w="9525">
+                <a14:hiddenLine xmlns:a14="http://schemas.microsoft.com/office/drawing/2010/main" xmlns="" w="9525">
                   <a:solidFill>
                     <a:srgbClr val="000000"/>
                   </a:solidFill>
@@ -2082,7 +2086,7 @@
             </a:ln>
             <a:extLst>
               <a:ext uri="{91240B29-F687-4f45-9708-019B960494DF}">
-                <a14:hiddenLine xmlns="" xmlns:a14="http://schemas.microsoft.com/office/drawing/2010/main" w="9525">
+                <a14:hiddenLine xmlns:a14="http://schemas.microsoft.com/office/drawing/2010/main" xmlns="" w="9525">
                   <a:solidFill>
                     <a:srgbClr val="000000"/>
                   </a:solidFill>
@@ -2172,7 +2176,7 @@
             </a:ln>
             <a:extLst>
               <a:ext uri="{91240B29-F687-4f45-9708-019B960494DF}">
-                <a14:hiddenLine xmlns="" xmlns:a14="http://schemas.microsoft.com/office/drawing/2010/main" w="9525">
+                <a14:hiddenLine xmlns:a14="http://schemas.microsoft.com/office/drawing/2010/main" xmlns="" w="9525">
                   <a:solidFill>
                     <a:srgbClr val="000000"/>
                   </a:solidFill>
@@ -2240,7 +2244,7 @@
             </a:ln>
             <a:extLst>
               <a:ext uri="{91240B29-F687-4f45-9708-019B960494DF}">
-                <a14:hiddenLine xmlns="" xmlns:a14="http://schemas.microsoft.com/office/drawing/2010/main" w="9525">
+                <a14:hiddenLine xmlns:a14="http://schemas.microsoft.com/office/drawing/2010/main" xmlns="" w="9525">
                   <a:solidFill>
                     <a:srgbClr val="000000"/>
                   </a:solidFill>
@@ -2330,7 +2334,7 @@
             </a:ln>
             <a:extLst>
               <a:ext uri="{91240B29-F687-4f45-9708-019B960494DF}">
-                <a14:hiddenLine xmlns="" xmlns:a14="http://schemas.microsoft.com/office/drawing/2010/main" w="9525">
+                <a14:hiddenLine xmlns:a14="http://schemas.microsoft.com/office/drawing/2010/main" xmlns="" w="9525">
                   <a:solidFill>
                     <a:srgbClr val="000000"/>
                   </a:solidFill>
@@ -2364,7 +2368,7 @@
             </a:ln>
             <a:extLst>
               <a:ext uri="{91240B29-F687-4f45-9708-019B960494DF}">
-                <a14:hiddenLine xmlns="" xmlns:a14="http://schemas.microsoft.com/office/drawing/2010/main" w="9525">
+                <a14:hiddenLine xmlns:a14="http://schemas.microsoft.com/office/drawing/2010/main" xmlns="" w="9525">
                   <a:solidFill>
                     <a:srgbClr val="000000"/>
                   </a:solidFill>
@@ -2454,7 +2458,7 @@
             </a:ln>
             <a:extLst>
               <a:ext uri="{91240B29-F687-4f45-9708-019B960494DF}">
-                <a14:hiddenLine xmlns="" xmlns:a14="http://schemas.microsoft.com/office/drawing/2010/main" w="9525">
+                <a14:hiddenLine xmlns:a14="http://schemas.microsoft.com/office/drawing/2010/main" xmlns="" w="9525">
                   <a:solidFill>
                     <a:srgbClr val="000000"/>
                   </a:solidFill>
@@ -2516,7 +2520,7 @@
             </a:ln>
             <a:extLst>
               <a:ext uri="{91240B29-F687-4f45-9708-019B960494DF}">
-                <a14:hiddenLine xmlns="" xmlns:a14="http://schemas.microsoft.com/office/drawing/2010/main" w="9525">
+                <a14:hiddenLine xmlns:a14="http://schemas.microsoft.com/office/drawing/2010/main" xmlns="" w="9525">
                   <a:solidFill>
                     <a:srgbClr val="000000"/>
                   </a:solidFill>
@@ -2578,7 +2582,7 @@
             </a:ln>
             <a:extLst>
               <a:ext uri="{91240B29-F687-4f45-9708-019B960494DF}">
-                <a14:hiddenLine xmlns="" xmlns:a14="http://schemas.microsoft.com/office/drawing/2010/main" w="9525">
+                <a14:hiddenLine xmlns:a14="http://schemas.microsoft.com/office/drawing/2010/main" xmlns="" w="9525">
                   <a:solidFill>
                     <a:srgbClr val="000000"/>
                   </a:solidFill>
@@ -2668,7 +2672,7 @@
             </a:ln>
             <a:extLst>
               <a:ext uri="{91240B29-F687-4f45-9708-019B960494DF}">
-                <a14:hiddenLine xmlns="" xmlns:a14="http://schemas.microsoft.com/office/drawing/2010/main" w="9525">
+                <a14:hiddenLine xmlns:a14="http://schemas.microsoft.com/office/drawing/2010/main" xmlns="" w="9525">
                   <a:solidFill>
                     <a:srgbClr val="000000"/>
                   </a:solidFill>
@@ -2736,7 +2740,7 @@
             </a:ln>
             <a:extLst>
               <a:ext uri="{91240B29-F687-4f45-9708-019B960494DF}">
-                <a14:hiddenLine xmlns="" xmlns:a14="http://schemas.microsoft.com/office/drawing/2010/main" w="9525">
+                <a14:hiddenLine xmlns:a14="http://schemas.microsoft.com/office/drawing/2010/main" xmlns="" w="9525">
                   <a:solidFill>
                     <a:srgbClr val="000000"/>
                   </a:solidFill>
@@ -2798,7 +2802,7 @@
             </a:ln>
             <a:extLst>
               <a:ext uri="{91240B29-F687-4f45-9708-019B960494DF}">
-                <a14:hiddenLine xmlns="" xmlns:a14="http://schemas.microsoft.com/office/drawing/2010/main" w="9525">
+                <a14:hiddenLine xmlns:a14="http://schemas.microsoft.com/office/drawing/2010/main" xmlns="" w="9525">
                   <a:solidFill>
                     <a:srgbClr val="000000"/>
                   </a:solidFill>
@@ -2888,7 +2892,7 @@
             </a:ln>
             <a:extLst>
               <a:ext uri="{91240B29-F687-4f45-9708-019B960494DF}">
-                <a14:hiddenLine xmlns="" xmlns:a14="http://schemas.microsoft.com/office/drawing/2010/main" w="9525">
+                <a14:hiddenLine xmlns:a14="http://schemas.microsoft.com/office/drawing/2010/main" xmlns="" w="9525">
                   <a:solidFill>
                     <a:srgbClr val="000000"/>
                   </a:solidFill>
@@ -2950,7 +2954,7 @@
             </a:ln>
             <a:extLst>
               <a:ext uri="{91240B29-F687-4f45-9708-019B960494DF}">
-                <a14:hiddenLine xmlns="" xmlns:a14="http://schemas.microsoft.com/office/drawing/2010/main" w="9525">
+                <a14:hiddenLine xmlns:a14="http://schemas.microsoft.com/office/drawing/2010/main" xmlns="" w="9525">
                   <a:solidFill>
                     <a:srgbClr val="000000"/>
                   </a:solidFill>
@@ -3040,7 +3044,7 @@
             </a:ln>
             <a:extLst>
               <a:ext uri="{91240B29-F687-4f45-9708-019B960494DF}">
-                <a14:hiddenLine xmlns="" xmlns:a14="http://schemas.microsoft.com/office/drawing/2010/main" w="9525">
+                <a14:hiddenLine xmlns:a14="http://schemas.microsoft.com/office/drawing/2010/main" xmlns="" w="9525">
                   <a:solidFill>
                     <a:srgbClr val="000000"/>
                   </a:solidFill>
@@ -3102,7 +3106,7 @@
             </a:ln>
             <a:extLst>
               <a:ext uri="{91240B29-F687-4f45-9708-019B960494DF}">
-                <a14:hiddenLine xmlns="" xmlns:a14="http://schemas.microsoft.com/office/drawing/2010/main" w="9525">
+                <a14:hiddenLine xmlns:a14="http://schemas.microsoft.com/office/drawing/2010/main" xmlns="" w="9525">
                   <a:solidFill>
                     <a:srgbClr val="000000"/>
                   </a:solidFill>
@@ -3192,7 +3196,7 @@
             </a:ln>
             <a:extLst>
               <a:ext uri="{91240B29-F687-4f45-9708-019B960494DF}">
-                <a14:hiddenLine xmlns="" xmlns:a14="http://schemas.microsoft.com/office/drawing/2010/main" w="9525">
+                <a14:hiddenLine xmlns:a14="http://schemas.microsoft.com/office/drawing/2010/main" xmlns="" w="9525">
                   <a:solidFill>
                     <a:srgbClr val="000000"/>
                   </a:solidFill>
@@ -3226,7 +3230,7 @@
             </a:ln>
             <a:extLst>
               <a:ext uri="{91240B29-F687-4f45-9708-019B960494DF}">
-                <a14:hiddenLine xmlns="" xmlns:a14="http://schemas.microsoft.com/office/drawing/2010/main" w="9525">
+                <a14:hiddenLine xmlns:a14="http://schemas.microsoft.com/office/drawing/2010/main" xmlns="" w="9525">
                   <a:solidFill>
                     <a:srgbClr val="000000"/>
                   </a:solidFill>
@@ -3291,7 +3295,7 @@
             </a:ln>
             <a:extLst>
               <a:ext uri="{91240B29-F687-4f45-9708-019B960494DF}">
-                <a14:hiddenLine xmlns="" xmlns:a14="http://schemas.microsoft.com/office/drawing/2010/main" w="9525">
+                <a14:hiddenLine xmlns:a14="http://schemas.microsoft.com/office/drawing/2010/main" xmlns="" w="9525">
                   <a:solidFill>
                     <a:srgbClr val="000000"/>
                   </a:solidFill>
@@ -3381,7 +3385,7 @@
             </a:ln>
             <a:extLst>
               <a:ext uri="{91240B29-F687-4f45-9708-019B960494DF}">
-                <a14:hiddenLine xmlns="" xmlns:a14="http://schemas.microsoft.com/office/drawing/2010/main" w="9525">
+                <a14:hiddenLine xmlns:a14="http://schemas.microsoft.com/office/drawing/2010/main" xmlns="" w="9525">
                   <a:solidFill>
                     <a:srgbClr val="000000"/>
                   </a:solidFill>
@@ -3443,7 +3447,7 @@
             </a:ln>
             <a:extLst>
               <a:ext uri="{91240B29-F687-4f45-9708-019B960494DF}">
-                <a14:hiddenLine xmlns="" xmlns:a14="http://schemas.microsoft.com/office/drawing/2010/main" w="9525">
+                <a14:hiddenLine xmlns:a14="http://schemas.microsoft.com/office/drawing/2010/main" xmlns="" w="9525">
                   <a:solidFill>
                     <a:srgbClr val="000000"/>
                   </a:solidFill>
@@ -3533,7 +3537,7 @@
             </a:ln>
             <a:extLst>
               <a:ext uri="{91240B29-F687-4f45-9708-019B960494DF}">
-                <a14:hiddenLine xmlns="" xmlns:a14="http://schemas.microsoft.com/office/drawing/2010/main" w="9525">
+                <a14:hiddenLine xmlns:a14="http://schemas.microsoft.com/office/drawing/2010/main" xmlns="" w="9525">
                   <a:solidFill>
                     <a:srgbClr val="000000"/>
                   </a:solidFill>
@@ -3623,7 +3627,7 @@
             </a:ln>
             <a:extLst>
               <a:ext uri="{91240B29-F687-4f45-9708-019B960494DF}">
-                <a14:hiddenLine xmlns="" xmlns:a14="http://schemas.microsoft.com/office/drawing/2010/main" w="9525">
+                <a14:hiddenLine xmlns:a14="http://schemas.microsoft.com/office/drawing/2010/main" xmlns="" w="9525">
                   <a:solidFill>
                     <a:srgbClr val="000000"/>
                   </a:solidFill>
@@ -3688,7 +3692,7 @@
             </a:ln>
             <a:extLst>
               <a:ext uri="{91240B29-F687-4f45-9708-019B960494DF}">
-                <a14:hiddenLine xmlns="" xmlns:a14="http://schemas.microsoft.com/office/drawing/2010/main" w="9525">
+                <a14:hiddenLine xmlns:a14="http://schemas.microsoft.com/office/drawing/2010/main" xmlns="" w="9525">
                   <a:solidFill>
                     <a:srgbClr val="000000"/>
                   </a:solidFill>
@@ -3750,7 +3754,7 @@
             </a:ln>
             <a:extLst>
               <a:ext uri="{91240B29-F687-4f45-9708-019B960494DF}">
-                <a14:hiddenLine xmlns="" xmlns:a14="http://schemas.microsoft.com/office/drawing/2010/main" w="9525">
+                <a14:hiddenLine xmlns:a14="http://schemas.microsoft.com/office/drawing/2010/main" xmlns="" w="9525">
                   <a:solidFill>
                     <a:srgbClr val="000000"/>
                   </a:solidFill>
@@ -3840,7 +3844,7 @@
             </a:ln>
             <a:extLst>
               <a:ext uri="{91240B29-F687-4f45-9708-019B960494DF}">
-                <a14:hiddenLine xmlns="" xmlns:a14="http://schemas.microsoft.com/office/drawing/2010/main" w="9525">
+                <a14:hiddenLine xmlns:a14="http://schemas.microsoft.com/office/drawing/2010/main" xmlns="" w="9525">
                   <a:solidFill>
                     <a:srgbClr val="000000"/>
                   </a:solidFill>
@@ -3930,7 +3934,7 @@
             </a:ln>
             <a:extLst>
               <a:ext uri="{91240B29-F687-4f45-9708-019B960494DF}">
-                <a14:hiddenLine xmlns="" xmlns:a14="http://schemas.microsoft.com/office/drawing/2010/main" w="9525">
+                <a14:hiddenLine xmlns:a14="http://schemas.microsoft.com/office/drawing/2010/main" xmlns="" w="9525">
                   <a:solidFill>
                     <a:srgbClr val="000000"/>
                   </a:solidFill>
@@ -3992,7 +3996,7 @@
             </a:ln>
             <a:extLst>
               <a:ext uri="{91240B29-F687-4f45-9708-019B960494DF}">
-                <a14:hiddenLine xmlns="" xmlns:a14="http://schemas.microsoft.com/office/drawing/2010/main" w="9525">
+                <a14:hiddenLine xmlns:a14="http://schemas.microsoft.com/office/drawing/2010/main" xmlns="" w="9525">
                   <a:solidFill>
                     <a:srgbClr val="000000"/>
                   </a:solidFill>
@@ -4112,7 +4116,7 @@
             </a:ln>
             <a:extLst>
               <a:ext uri="{91240B29-F687-4f45-9708-019B960494DF}">
-                <a14:hiddenLine xmlns="" xmlns:a14="http://schemas.microsoft.com/office/drawing/2010/main" w="9525">
+                <a14:hiddenLine xmlns:a14="http://schemas.microsoft.com/office/drawing/2010/main" xmlns="" w="9525">
                   <a:solidFill>
                     <a:srgbClr val="000000"/>
                   </a:solidFill>
@@ -4180,7 +4184,7 @@
             </a:ln>
             <a:extLst>
               <a:ext uri="{91240B29-F687-4f45-9708-019B960494DF}">
-                <a14:hiddenLine xmlns="" xmlns:a14="http://schemas.microsoft.com/office/drawing/2010/main" w="9525">
+                <a14:hiddenLine xmlns:a14="http://schemas.microsoft.com/office/drawing/2010/main" xmlns="" w="9525">
                   <a:solidFill>
                     <a:srgbClr val="000000"/>
                   </a:solidFill>
@@ -4270,7 +4274,7 @@
             </a:ln>
             <a:extLst>
               <a:ext uri="{91240B29-F687-4f45-9708-019B960494DF}">
-                <a14:hiddenLine xmlns="" xmlns:a14="http://schemas.microsoft.com/office/drawing/2010/main" w="9525">
+                <a14:hiddenLine xmlns:a14="http://schemas.microsoft.com/office/drawing/2010/main" xmlns="" w="9525">
                   <a:solidFill>
                     <a:srgbClr val="000000"/>
                   </a:solidFill>
@@ -8999,7 +9003,7 @@
           <a:noFill/>
           <a:extLst>
             <a:ext uri="{909E8E84-426E-40dd-AFC4-6F175D3DCCD1}">
-              <a14:hiddenFill xmlns="" xmlns:a14="http://schemas.microsoft.com/office/drawing/2010/main">
+              <a14:hiddenFill xmlns:a14="http://schemas.microsoft.com/office/drawing/2010/main" xmlns="">
                 <a:solidFill>
                   <a:srgbClr val="FFFFFF"/>
                 </a:solidFill>
@@ -9073,7 +9077,7 @@
               </a:ln>
               <a:extLst>
                 <a:ext uri="{91240B29-F687-4f45-9708-019B960494DF}">
-                  <a14:hiddenLine xmlns="" xmlns:a14="http://schemas.microsoft.com/office/drawing/2010/main" w="9525">
+                  <a14:hiddenLine xmlns:a14="http://schemas.microsoft.com/office/drawing/2010/main" xmlns="" w="9525">
                     <a:solidFill>
                       <a:srgbClr val="000000"/>
                     </a:solidFill>
@@ -9163,7 +9167,7 @@
               </a:ln>
               <a:extLst>
                 <a:ext uri="{91240B29-F687-4f45-9708-019B960494DF}">
-                  <a14:hiddenLine xmlns="" xmlns:a14="http://schemas.microsoft.com/office/drawing/2010/main" w="9525">
+                  <a14:hiddenLine xmlns:a14="http://schemas.microsoft.com/office/drawing/2010/main" xmlns="" w="9525">
                     <a:solidFill>
                       <a:srgbClr val="000000"/>
                     </a:solidFill>
@@ -9253,7 +9257,7 @@
               </a:ln>
               <a:extLst>
                 <a:ext uri="{91240B29-F687-4f45-9708-019B960494DF}">
-                  <a14:hiddenLine xmlns="" xmlns:a14="http://schemas.microsoft.com/office/drawing/2010/main" w="9525">
+                  <a14:hiddenLine xmlns:a14="http://schemas.microsoft.com/office/drawing/2010/main" xmlns="" w="9525">
                     <a:solidFill>
                       <a:srgbClr val="000000"/>
                     </a:solidFill>
@@ -9315,7 +9319,7 @@
               </a:ln>
               <a:extLst>
                 <a:ext uri="{91240B29-F687-4f45-9708-019B960494DF}">
-                  <a14:hiddenLine xmlns="" xmlns:a14="http://schemas.microsoft.com/office/drawing/2010/main" w="9525">
+                  <a14:hiddenLine xmlns:a14="http://schemas.microsoft.com/office/drawing/2010/main" xmlns="" w="9525">
                     <a:solidFill>
                       <a:srgbClr val="000000"/>
                     </a:solidFill>
@@ -9405,7 +9409,7 @@
               </a:ln>
               <a:extLst>
                 <a:ext uri="{91240B29-F687-4f45-9708-019B960494DF}">
-                  <a14:hiddenLine xmlns="" xmlns:a14="http://schemas.microsoft.com/office/drawing/2010/main" w="9525">
+                  <a14:hiddenLine xmlns:a14="http://schemas.microsoft.com/office/drawing/2010/main" xmlns="" w="9525">
                     <a:solidFill>
                       <a:srgbClr val="000000"/>
                     </a:solidFill>
@@ -9467,7 +9471,7 @@
               </a:ln>
               <a:extLst>
                 <a:ext uri="{91240B29-F687-4f45-9708-019B960494DF}">
-                  <a14:hiddenLine xmlns="" xmlns:a14="http://schemas.microsoft.com/office/drawing/2010/main" w="9525">
+                  <a14:hiddenLine xmlns:a14="http://schemas.microsoft.com/office/drawing/2010/main" xmlns="" w="9525">
                     <a:solidFill>
                       <a:srgbClr val="000000"/>
                     </a:solidFill>
@@ -9529,7 +9533,7 @@
               </a:ln>
               <a:extLst>
                 <a:ext uri="{91240B29-F687-4f45-9708-019B960494DF}">
-                  <a14:hiddenLine xmlns="" xmlns:a14="http://schemas.microsoft.com/office/drawing/2010/main" w="9525">
+                  <a14:hiddenLine xmlns:a14="http://schemas.microsoft.com/office/drawing/2010/main" xmlns="" w="9525">
                     <a:solidFill>
                       <a:srgbClr val="000000"/>
                     </a:solidFill>
@@ -9619,7 +9623,7 @@
               </a:ln>
               <a:extLst>
                 <a:ext uri="{91240B29-F687-4f45-9708-019B960494DF}">
-                  <a14:hiddenLine xmlns="" xmlns:a14="http://schemas.microsoft.com/office/drawing/2010/main" w="9525">
+                  <a14:hiddenLine xmlns:a14="http://schemas.microsoft.com/office/drawing/2010/main" xmlns="" w="9525">
                     <a:solidFill>
                       <a:srgbClr val="000000"/>
                     </a:solidFill>
@@ -9709,7 +9713,7 @@
               </a:ln>
               <a:extLst>
                 <a:ext uri="{91240B29-F687-4f45-9708-019B960494DF}">
-                  <a14:hiddenLine xmlns="" xmlns:a14="http://schemas.microsoft.com/office/drawing/2010/main" w="9525">
+                  <a14:hiddenLine xmlns:a14="http://schemas.microsoft.com/office/drawing/2010/main" xmlns="" w="9525">
                     <a:solidFill>
                       <a:srgbClr val="000000"/>
                     </a:solidFill>
@@ -9771,7 +9775,7 @@
               </a:ln>
               <a:extLst>
                 <a:ext uri="{91240B29-F687-4f45-9708-019B960494DF}">
-                  <a14:hiddenLine xmlns="" xmlns:a14="http://schemas.microsoft.com/office/drawing/2010/main" w="9525">
+                  <a14:hiddenLine xmlns:a14="http://schemas.microsoft.com/office/drawing/2010/main" xmlns="" w="9525">
                     <a:solidFill>
                       <a:srgbClr val="000000"/>
                     </a:solidFill>
@@ -9881,7 +9885,7 @@
               </a:ln>
               <a:extLst>
                 <a:ext uri="{91240B29-F687-4f45-9708-019B960494DF}">
-                  <a14:hiddenLine xmlns="" xmlns:a14="http://schemas.microsoft.com/office/drawing/2010/main" w="9525">
+                  <a14:hiddenLine xmlns:a14="http://schemas.microsoft.com/office/drawing/2010/main" xmlns="" w="9525">
                     <a:solidFill>
                       <a:srgbClr val="000000"/>
                     </a:solidFill>
@@ -9965,7 +9969,7 @@
               </a:ln>
               <a:extLst>
                 <a:ext uri="{91240B29-F687-4f45-9708-019B960494DF}">
-                  <a14:hiddenLine xmlns="" xmlns:a14="http://schemas.microsoft.com/office/drawing/2010/main" w="9525">
+                  <a14:hiddenLine xmlns:a14="http://schemas.microsoft.com/office/drawing/2010/main" xmlns="" w="9525">
                     <a:solidFill>
                       <a:srgbClr val="000000"/>
                     </a:solidFill>
@@ -10027,7 +10031,7 @@
               </a:ln>
               <a:extLst>
                 <a:ext uri="{91240B29-F687-4f45-9708-019B960494DF}">
-                  <a14:hiddenLine xmlns="" xmlns:a14="http://schemas.microsoft.com/office/drawing/2010/main" w="9525">
+                  <a14:hiddenLine xmlns:a14="http://schemas.microsoft.com/office/drawing/2010/main" xmlns="" w="9525">
                     <a:solidFill>
                       <a:srgbClr val="000000"/>
                     </a:solidFill>
@@ -10089,7 +10093,7 @@
               </a:ln>
               <a:extLst>
                 <a:ext uri="{91240B29-F687-4f45-9708-019B960494DF}">
-                  <a14:hiddenLine xmlns="" xmlns:a14="http://schemas.microsoft.com/office/drawing/2010/main" w="9525">
+                  <a14:hiddenLine xmlns:a14="http://schemas.microsoft.com/office/drawing/2010/main" xmlns="" w="9525">
                     <a:solidFill>
                       <a:srgbClr val="000000"/>
                     </a:solidFill>
@@ -10179,7 +10183,7 @@
               </a:ln>
               <a:extLst>
                 <a:ext uri="{91240B29-F687-4f45-9708-019B960494DF}">
-                  <a14:hiddenLine xmlns="" xmlns:a14="http://schemas.microsoft.com/office/drawing/2010/main" w="9525">
+                  <a14:hiddenLine xmlns:a14="http://schemas.microsoft.com/office/drawing/2010/main" xmlns="" w="9525">
                     <a:solidFill>
                       <a:srgbClr val="000000"/>
                     </a:solidFill>
@@ -10213,7 +10217,7 @@
               </a:ln>
               <a:extLst>
                 <a:ext uri="{91240B29-F687-4f45-9708-019B960494DF}">
-                  <a14:hiddenLine xmlns="" xmlns:a14="http://schemas.microsoft.com/office/drawing/2010/main" w="9525">
+                  <a14:hiddenLine xmlns:a14="http://schemas.microsoft.com/office/drawing/2010/main" xmlns="" w="9525">
                     <a:solidFill>
                       <a:srgbClr val="000000"/>
                     </a:solidFill>
@@ -10278,7 +10282,7 @@
               </a:ln>
               <a:extLst>
                 <a:ext uri="{91240B29-F687-4f45-9708-019B960494DF}">
-                  <a14:hiddenLine xmlns="" xmlns:a14="http://schemas.microsoft.com/office/drawing/2010/main" w="9525">
+                  <a14:hiddenLine xmlns:a14="http://schemas.microsoft.com/office/drawing/2010/main" xmlns="" w="9525">
                     <a:solidFill>
                       <a:srgbClr val="000000"/>
                     </a:solidFill>
@@ -10368,7 +10372,7 @@
               </a:ln>
               <a:extLst>
                 <a:ext uri="{91240B29-F687-4f45-9708-019B960494DF}">
-                  <a14:hiddenLine xmlns="" xmlns:a14="http://schemas.microsoft.com/office/drawing/2010/main" w="9525">
+                  <a14:hiddenLine xmlns:a14="http://schemas.microsoft.com/office/drawing/2010/main" xmlns="" w="9525">
                     <a:solidFill>
                       <a:srgbClr val="000000"/>
                     </a:solidFill>
@@ -10430,7 +10434,7 @@
               </a:ln>
               <a:extLst>
                 <a:ext uri="{91240B29-F687-4f45-9708-019B960494DF}">
-                  <a14:hiddenLine xmlns="" xmlns:a14="http://schemas.microsoft.com/office/drawing/2010/main" w="9525">
+                  <a14:hiddenLine xmlns:a14="http://schemas.microsoft.com/office/drawing/2010/main" xmlns="" w="9525">
                     <a:solidFill>
                       <a:srgbClr val="000000"/>
                     </a:solidFill>
@@ -10520,7 +10524,7 @@
               </a:ln>
               <a:extLst>
                 <a:ext uri="{91240B29-F687-4f45-9708-019B960494DF}">
-                  <a14:hiddenLine xmlns="" xmlns:a14="http://schemas.microsoft.com/office/drawing/2010/main" w="9525">
+                  <a14:hiddenLine xmlns:a14="http://schemas.microsoft.com/office/drawing/2010/main" xmlns="" w="9525">
                     <a:solidFill>
                       <a:srgbClr val="000000"/>
                     </a:solidFill>
@@ -10585,7 +10589,7 @@
               </a:ln>
               <a:extLst>
                 <a:ext uri="{91240B29-F687-4f45-9708-019B960494DF}">
-                  <a14:hiddenLine xmlns="" xmlns:a14="http://schemas.microsoft.com/office/drawing/2010/main" w="9525">
+                  <a14:hiddenLine xmlns:a14="http://schemas.microsoft.com/office/drawing/2010/main" xmlns="" w="9525">
                     <a:solidFill>
                       <a:srgbClr val="000000"/>
                     </a:solidFill>
@@ -10647,7 +10651,7 @@
               </a:ln>
               <a:extLst>
                 <a:ext uri="{91240B29-F687-4f45-9708-019B960494DF}">
-                  <a14:hiddenLine xmlns="" xmlns:a14="http://schemas.microsoft.com/office/drawing/2010/main" w="9525">
+                  <a14:hiddenLine xmlns:a14="http://schemas.microsoft.com/office/drawing/2010/main" xmlns="" w="9525">
                     <a:solidFill>
                       <a:srgbClr val="000000"/>
                     </a:solidFill>
@@ -10737,7 +10741,7 @@
               </a:ln>
               <a:extLst>
                 <a:ext uri="{91240B29-F687-4f45-9708-019B960494DF}">
-                  <a14:hiddenLine xmlns="" xmlns:a14="http://schemas.microsoft.com/office/drawing/2010/main" w="9525">
+                  <a14:hiddenLine xmlns:a14="http://schemas.microsoft.com/office/drawing/2010/main" xmlns="" w="9525">
                     <a:solidFill>
                       <a:srgbClr val="000000"/>
                     </a:solidFill>
@@ -10827,7 +10831,7 @@
               </a:ln>
               <a:extLst>
                 <a:ext uri="{91240B29-F687-4f45-9708-019B960494DF}">
-                  <a14:hiddenLine xmlns="" xmlns:a14="http://schemas.microsoft.com/office/drawing/2010/main" w="9525">
+                  <a14:hiddenLine xmlns:a14="http://schemas.microsoft.com/office/drawing/2010/main" xmlns="" w="9525">
                     <a:solidFill>
                       <a:srgbClr val="000000"/>
                     </a:solidFill>
@@ -10892,7 +10896,7 @@
               </a:ln>
               <a:extLst>
                 <a:ext uri="{91240B29-F687-4f45-9708-019B960494DF}">
-                  <a14:hiddenLine xmlns="" xmlns:a14="http://schemas.microsoft.com/office/drawing/2010/main" w="9525">
+                  <a14:hiddenLine xmlns:a14="http://schemas.microsoft.com/office/drawing/2010/main" xmlns="" w="9525">
                     <a:solidFill>
                       <a:srgbClr val="000000"/>
                     </a:solidFill>
@@ -11012,7 +11016,7 @@
               </a:ln>
               <a:extLst>
                 <a:ext uri="{91240B29-F687-4f45-9708-019B960494DF}">
-                  <a14:hiddenLine xmlns="" xmlns:a14="http://schemas.microsoft.com/office/drawing/2010/main" w="9525">
+                  <a14:hiddenLine xmlns:a14="http://schemas.microsoft.com/office/drawing/2010/main" xmlns="" w="9525">
                     <a:solidFill>
                       <a:srgbClr val="000000"/>
                     </a:solidFill>
@@ -11093,7 +11097,7 @@
               </a:ln>
               <a:extLst>
                 <a:ext uri="{91240B29-F687-4f45-9708-019B960494DF}">
-                  <a14:hiddenLine xmlns="" xmlns:a14="http://schemas.microsoft.com/office/drawing/2010/main" w="9525">
+                  <a14:hiddenLine xmlns:a14="http://schemas.microsoft.com/office/drawing/2010/main" xmlns="" w="9525">
                     <a:solidFill>
                       <a:srgbClr val="000000"/>
                     </a:solidFill>
@@ -11208,7 +11212,7 @@
               </a:ln>
               <a:extLst>
                 <a:ext uri="{91240B29-F687-4f45-9708-019B960494DF}">
-                  <a14:hiddenLine xmlns="" xmlns:a14="http://schemas.microsoft.com/office/drawing/2010/main" w="9525">
+                  <a14:hiddenLine xmlns:a14="http://schemas.microsoft.com/office/drawing/2010/main" xmlns="" w="9525">
                     <a:solidFill>
                       <a:srgbClr val="000000"/>
                     </a:solidFill>
@@ -11298,7 +11302,7 @@
               </a:ln>
               <a:extLst>
                 <a:ext uri="{91240B29-F687-4f45-9708-019B960494DF}">
-                  <a14:hiddenLine xmlns="" xmlns:a14="http://schemas.microsoft.com/office/drawing/2010/main" w="9525">
+                  <a14:hiddenLine xmlns:a14="http://schemas.microsoft.com/office/drawing/2010/main" xmlns="" w="9525">
                     <a:solidFill>
                       <a:srgbClr val="000000"/>
                     </a:solidFill>
@@ -11363,7 +11367,7 @@
               </a:ln>
               <a:extLst>
                 <a:ext uri="{91240B29-F687-4f45-9708-019B960494DF}">
-                  <a14:hiddenLine xmlns="" xmlns:a14="http://schemas.microsoft.com/office/drawing/2010/main" w="9525">
+                  <a14:hiddenLine xmlns:a14="http://schemas.microsoft.com/office/drawing/2010/main" xmlns="" w="9525">
                     <a:solidFill>
                       <a:srgbClr val="000000"/>
                     </a:solidFill>
@@ -11453,7 +11457,7 @@
               </a:ln>
               <a:extLst>
                 <a:ext uri="{91240B29-F687-4f45-9708-019B960494DF}">
-                  <a14:hiddenLine xmlns="" xmlns:a14="http://schemas.microsoft.com/office/drawing/2010/main" w="9525">
+                  <a14:hiddenLine xmlns:a14="http://schemas.microsoft.com/office/drawing/2010/main" xmlns="" w="9525">
                     <a:solidFill>
                       <a:srgbClr val="000000"/>
                     </a:solidFill>
@@ -11521,7 +11525,7 @@
               </a:ln>
               <a:extLst>
                 <a:ext uri="{91240B29-F687-4f45-9708-019B960494DF}">
-                  <a14:hiddenLine xmlns="" xmlns:a14="http://schemas.microsoft.com/office/drawing/2010/main" w="9525">
+                  <a14:hiddenLine xmlns:a14="http://schemas.microsoft.com/office/drawing/2010/main" xmlns="" w="9525">
                     <a:solidFill>
                       <a:srgbClr val="000000"/>
                     </a:solidFill>
@@ -11611,7 +11615,7 @@
               </a:ln>
               <a:extLst>
                 <a:ext uri="{91240B29-F687-4f45-9708-019B960494DF}">
-                  <a14:hiddenLine xmlns="" xmlns:a14="http://schemas.microsoft.com/office/drawing/2010/main" w="9525">
+                  <a14:hiddenLine xmlns:a14="http://schemas.microsoft.com/office/drawing/2010/main" xmlns="" w="9525">
                     <a:solidFill>
                       <a:srgbClr val="000000"/>
                     </a:solidFill>
@@ -11679,7 +11683,7 @@
               </a:ln>
               <a:extLst>
                 <a:ext uri="{91240B29-F687-4f45-9708-019B960494DF}">
-                  <a14:hiddenLine xmlns="" xmlns:a14="http://schemas.microsoft.com/office/drawing/2010/main" w="9525">
+                  <a14:hiddenLine xmlns:a14="http://schemas.microsoft.com/office/drawing/2010/main" xmlns="" w="9525">
                     <a:solidFill>
                       <a:srgbClr val="000000"/>
                     </a:solidFill>
@@ -11769,7 +11773,7 @@
               </a:ln>
               <a:extLst>
                 <a:ext uri="{91240B29-F687-4f45-9708-019B960494DF}">
-                  <a14:hiddenLine xmlns="" xmlns:a14="http://schemas.microsoft.com/office/drawing/2010/main" w="9525">
+                  <a14:hiddenLine xmlns:a14="http://schemas.microsoft.com/office/drawing/2010/main" xmlns="" w="9525">
                     <a:solidFill>
                       <a:srgbClr val="000000"/>
                     </a:solidFill>
@@ -11803,7 +11807,7 @@
               </a:ln>
               <a:extLst>
                 <a:ext uri="{91240B29-F687-4f45-9708-019B960494DF}">
-                  <a14:hiddenLine xmlns="" xmlns:a14="http://schemas.microsoft.com/office/drawing/2010/main" w="9525">
+                  <a14:hiddenLine xmlns:a14="http://schemas.microsoft.com/office/drawing/2010/main" xmlns="" w="9525">
                     <a:solidFill>
                       <a:srgbClr val="000000"/>
                     </a:solidFill>
@@ -12429,6 +12433,711 @@
 </p:sld>
 </file>
 
+<file path=ppt/slides/slide10.xml><?xml version="1.0" encoding="utf-8"?>
+<p:sld xmlns:a="http://schemas.openxmlformats.org/drawingml/2006/main" xmlns:r="http://schemas.openxmlformats.org/officeDocument/2006/relationships" xmlns:p="http://schemas.openxmlformats.org/presentationml/2006/main">
+  <p:cSld>
+    <p:bg>
+      <p:bgPr>
+        <a:blipFill>
+          <a:blip r:embed="rId2">
+            <a:duotone>
+              <a:schemeClr val="bg2">
+                <a:shade val="48000"/>
+                <a:hueMod val="106000"/>
+                <a:satMod val="140000"/>
+                <a:lumMod val="42000"/>
+              </a:schemeClr>
+              <a:schemeClr val="bg2">
+                <a:tint val="98000"/>
+                <a:hueMod val="92000"/>
+                <a:satMod val="220000"/>
+                <a:lumMod val="90000"/>
+              </a:schemeClr>
+            </a:duotone>
+          </a:blip>
+          <a:stretch/>
+        </a:blipFill>
+        <a:effectLst/>
+      </p:bgPr>
+    </p:bg>
+    <p:spTree>
+      <p:nvGrpSpPr>
+        <p:cNvPr id="1" name=""/>
+        <p:cNvGrpSpPr/>
+        <p:nvPr/>
+      </p:nvGrpSpPr>
+      <p:grpSpPr>
+        <a:xfrm>
+          <a:off x="0" y="0"/>
+          <a:ext cx="0" cy="0"/>
+          <a:chOff x="0" y="0"/>
+          <a:chExt cx="0" cy="0"/>
+        </a:xfrm>
+      </p:grpSpPr>
+      <p:sp>
+        <p:nvSpPr>
+          <p:cNvPr id="2" name="Title 1">
+            <a:extLst>
+              <a:ext uri="{FF2B5EF4-FFF2-40B4-BE49-F238E27FC236}">
+                <a16:creationId xmlns:a16="http://schemas.microsoft.com/office/drawing/2014/main" id="{57C3DCF6-FD03-420A-BE13-C59CB22ED280}"/>
+              </a:ext>
+            </a:extLst>
+          </p:cNvPr>
+          <p:cNvSpPr>
+            <a:spLocks noGrp="1"/>
+          </p:cNvSpPr>
+          <p:nvPr>
+            <p:ph type="title"/>
+          </p:nvPr>
+        </p:nvSpPr>
+        <p:spPr>
+          <a:xfrm>
+            <a:off x="1141413" y="618518"/>
+            <a:ext cx="9905998" cy="1478570"/>
+          </a:xfrm>
+        </p:spPr>
+        <p:txBody>
+          <a:bodyPr>
+            <a:normAutofit/>
+          </a:bodyPr>
+          <a:lstStyle/>
+          <a:p>
+            <a:r>
+              <a:rPr lang="en-US" dirty="0"/>
+              <a:t>Functionality: Controllers and Services</a:t>
+            </a:r>
+          </a:p>
+        </p:txBody>
+      </p:sp>
+      <p:pic>
+        <p:nvPicPr>
+          <p:cNvPr id="7" name="Picture 6">
+            <a:extLst>
+              <a:ext uri="{FF2B5EF4-FFF2-40B4-BE49-F238E27FC236}">
+                <a16:creationId xmlns:a16="http://schemas.microsoft.com/office/drawing/2014/main" id="{FD42F8AB-6762-4399-8E9B-E8AF5BCA0D08}"/>
+              </a:ext>
+            </a:extLst>
+          </p:cNvPr>
+          <p:cNvPicPr>
+            <a:picLocks noChangeAspect="1"/>
+          </p:cNvPicPr>
+          <p:nvPr/>
+        </p:nvPicPr>
+        <p:blipFill>
+          <a:blip r:embed="rId3"/>
+          <a:stretch>
+            <a:fillRect/>
+          </a:stretch>
+        </p:blipFill>
+        <p:spPr>
+          <a:xfrm>
+            <a:off x="1141413" y="3574551"/>
+            <a:ext cx="3494597" cy="2365574"/>
+          </a:xfrm>
+          <a:prstGeom prst="round2DiagRect">
+            <a:avLst>
+              <a:gd name="adj1" fmla="val 5608"/>
+              <a:gd name="adj2" fmla="val 0"/>
+            </a:avLst>
+          </a:prstGeom>
+          <a:ln w="19050" cap="sq">
+            <a:solidFill>
+              <a:schemeClr val="tx2">
+                <a:lumMod val="60000"/>
+                <a:lumOff val="40000"/>
+                <a:alpha val="60000"/>
+              </a:schemeClr>
+            </a:solidFill>
+            <a:miter lim="800000"/>
+          </a:ln>
+          <a:effectLst>
+            <a:outerShdw blurRad="88900" dist="38100" dir="5400000" algn="t" rotWithShape="0">
+              <a:prstClr val="black">
+                <a:alpha val="40000"/>
+              </a:prstClr>
+            </a:outerShdw>
+          </a:effectLst>
+        </p:spPr>
+      </p:pic>
+      <p:pic>
+        <p:nvPicPr>
+          <p:cNvPr id="5" name="Picture 4">
+            <a:extLst>
+              <a:ext uri="{FF2B5EF4-FFF2-40B4-BE49-F238E27FC236}">
+                <a16:creationId xmlns:a16="http://schemas.microsoft.com/office/drawing/2014/main" id="{B0B47018-B583-425E-9FAB-0DCA3130BD9A}"/>
+              </a:ext>
+            </a:extLst>
+          </p:cNvPr>
+          <p:cNvPicPr>
+            <a:picLocks noChangeAspect="1"/>
+          </p:cNvPicPr>
+          <p:nvPr/>
+        </p:nvPicPr>
+        <p:blipFill>
+          <a:blip r:embed="rId4"/>
+          <a:stretch>
+            <a:fillRect/>
+          </a:stretch>
+        </p:blipFill>
+        <p:spPr>
+          <a:xfrm>
+            <a:off x="1141413" y="1961015"/>
+            <a:ext cx="3494597" cy="1372111"/>
+          </a:xfrm>
+          <a:prstGeom prst="round2DiagRect">
+            <a:avLst>
+              <a:gd name="adj1" fmla="val 5608"/>
+              <a:gd name="adj2" fmla="val 0"/>
+            </a:avLst>
+          </a:prstGeom>
+          <a:ln w="19050" cap="sq">
+            <a:solidFill>
+              <a:schemeClr val="tx2">
+                <a:lumMod val="60000"/>
+                <a:lumOff val="40000"/>
+                <a:alpha val="60000"/>
+              </a:schemeClr>
+            </a:solidFill>
+            <a:miter lim="800000"/>
+          </a:ln>
+          <a:effectLst>
+            <a:outerShdw blurRad="88900" dist="38100" dir="5400000" algn="t" rotWithShape="0">
+              <a:prstClr val="black">
+                <a:alpha val="40000"/>
+              </a:prstClr>
+            </a:outerShdw>
+          </a:effectLst>
+        </p:spPr>
+      </p:pic>
+      <p:sp>
+        <p:nvSpPr>
+          <p:cNvPr id="3" name="Content Placeholder 2">
+            <a:extLst>
+              <a:ext uri="{FF2B5EF4-FFF2-40B4-BE49-F238E27FC236}">
+                <a16:creationId xmlns:a16="http://schemas.microsoft.com/office/drawing/2014/main" id="{F81A2028-62D2-4423-9164-38E85E239A46}"/>
+              </a:ext>
+            </a:extLst>
+          </p:cNvPr>
+          <p:cNvSpPr>
+            <a:spLocks noGrp="1"/>
+          </p:cNvSpPr>
+          <p:nvPr>
+            <p:ph idx="1"/>
+          </p:nvPr>
+        </p:nvSpPr>
+        <p:spPr>
+          <a:xfrm>
+            <a:off x="5034579" y="2019300"/>
+            <a:ext cx="6012832" cy="3771901"/>
+          </a:xfrm>
+        </p:spPr>
+        <p:txBody>
+          <a:bodyPr>
+            <a:normAutofit/>
+          </a:bodyPr>
+          <a:lstStyle/>
+          <a:p>
+            <a:r>
+              <a:rPr lang="en-US" dirty="0"/>
+              <a:t>Controllers receive request to an action which handles view selection and data validation.</a:t>
+            </a:r>
+          </a:p>
+          <a:p>
+            <a:pPr lvl="1"/>
+            <a:r>
+              <a:rPr lang="en-US" dirty="0"/>
+              <a:t>Models have annotations which denote which fields must be filled out controller verifies there was not a failure in the given data in a POST.</a:t>
+            </a:r>
+          </a:p>
+          <a:p>
+            <a:pPr lvl="1"/>
+            <a:r>
+              <a:rPr lang="en-US" dirty="0"/>
+              <a:t>Model is retrieved via Services and then passed to views</a:t>
+            </a:r>
+          </a:p>
+          <a:p>
+            <a:r>
+              <a:rPr lang="en-US" dirty="0"/>
+              <a:t>Services handle most of the business logic</a:t>
+            </a:r>
+          </a:p>
+        </p:txBody>
+      </p:sp>
+    </p:spTree>
+    <p:extLst>
+      <p:ext uri="{BB962C8B-B14F-4D97-AF65-F5344CB8AC3E}">
+        <p14:creationId xmlns:p14="http://schemas.microsoft.com/office/powerpoint/2010/main" val="4125134401"/>
+      </p:ext>
+    </p:extLst>
+  </p:cSld>
+  <p:clrMapOvr>
+    <a:masterClrMapping/>
+  </p:clrMapOvr>
+</p:sld>
+</file>
+
+<file path=ppt/slides/slide11.xml><?xml version="1.0" encoding="utf-8"?>
+<p:sld xmlns:a="http://schemas.openxmlformats.org/drawingml/2006/main" xmlns:r="http://schemas.openxmlformats.org/officeDocument/2006/relationships" xmlns:p="http://schemas.openxmlformats.org/presentationml/2006/main">
+  <p:cSld>
+    <p:bg>
+      <p:bgPr>
+        <a:blipFill>
+          <a:blip r:embed="rId2">
+            <a:duotone>
+              <a:schemeClr val="bg2">
+                <a:shade val="48000"/>
+                <a:hueMod val="106000"/>
+                <a:satMod val="140000"/>
+                <a:lumMod val="42000"/>
+              </a:schemeClr>
+              <a:schemeClr val="bg2">
+                <a:tint val="98000"/>
+                <a:hueMod val="92000"/>
+                <a:satMod val="220000"/>
+                <a:lumMod val="90000"/>
+              </a:schemeClr>
+            </a:duotone>
+          </a:blip>
+          <a:stretch/>
+        </a:blipFill>
+        <a:effectLst/>
+      </p:bgPr>
+    </p:bg>
+    <p:spTree>
+      <p:nvGrpSpPr>
+        <p:cNvPr id="1" name=""/>
+        <p:cNvGrpSpPr/>
+        <p:nvPr/>
+      </p:nvGrpSpPr>
+      <p:grpSpPr>
+        <a:xfrm>
+          <a:off x="0" y="0"/>
+          <a:ext cx="0" cy="0"/>
+          <a:chOff x="0" y="0"/>
+          <a:chExt cx="0" cy="0"/>
+        </a:xfrm>
+      </p:grpSpPr>
+      <p:sp>
+        <p:nvSpPr>
+          <p:cNvPr id="2" name="Title 1">
+            <a:extLst>
+              <a:ext uri="{FF2B5EF4-FFF2-40B4-BE49-F238E27FC236}">
+                <a16:creationId xmlns:a16="http://schemas.microsoft.com/office/drawing/2014/main" id="{5810C46C-D346-4377-96C3-5319D6099031}"/>
+              </a:ext>
+            </a:extLst>
+          </p:cNvPr>
+          <p:cNvSpPr>
+            <a:spLocks noGrp="1"/>
+          </p:cNvSpPr>
+          <p:nvPr>
+            <p:ph type="title"/>
+          </p:nvPr>
+        </p:nvSpPr>
+        <p:spPr>
+          <a:xfrm>
+            <a:off x="1141413" y="618518"/>
+            <a:ext cx="9905998" cy="1478570"/>
+          </a:xfrm>
+        </p:spPr>
+        <p:txBody>
+          <a:bodyPr>
+            <a:normAutofit/>
+          </a:bodyPr>
+          <a:lstStyle/>
+          <a:p>
+            <a:pPr algn="ctr"/>
+            <a:r>
+              <a:rPr lang="en-US" dirty="0"/>
+              <a:t>Functionality: Layout and Views</a:t>
+            </a:r>
+            <a:endParaRPr lang="en-US"/>
+          </a:p>
+        </p:txBody>
+      </p:sp>
+      <p:pic>
+        <p:nvPicPr>
+          <p:cNvPr id="5" name="Picture 4">
+            <a:extLst>
+              <a:ext uri="{FF2B5EF4-FFF2-40B4-BE49-F238E27FC236}">
+                <a16:creationId xmlns:a16="http://schemas.microsoft.com/office/drawing/2014/main" id="{8C4A0054-39FC-4064-BDE9-F3C42D087727}"/>
+              </a:ext>
+            </a:extLst>
+          </p:cNvPr>
+          <p:cNvPicPr>
+            <a:picLocks noChangeAspect="1"/>
+          </p:cNvPicPr>
+          <p:nvPr/>
+        </p:nvPicPr>
+        <p:blipFill rotWithShape="1">
+          <a:blip r:embed="rId3"/>
+          <a:srcRect r="2748"/>
+          <a:stretch/>
+        </p:blipFill>
+        <p:spPr>
+          <a:xfrm>
+            <a:off x="1141411" y="2249487"/>
+            <a:ext cx="3494597" cy="3549650"/>
+          </a:xfrm>
+          <a:prstGeom prst="round2DiagRect">
+            <a:avLst>
+              <a:gd name="adj1" fmla="val 5608"/>
+              <a:gd name="adj2" fmla="val 0"/>
+            </a:avLst>
+          </a:prstGeom>
+          <a:ln w="19050" cap="sq">
+            <a:solidFill>
+              <a:schemeClr val="tx2">
+                <a:lumMod val="60000"/>
+                <a:lumOff val="40000"/>
+                <a:alpha val="60000"/>
+              </a:schemeClr>
+            </a:solidFill>
+            <a:miter lim="800000"/>
+          </a:ln>
+          <a:effectLst>
+            <a:outerShdw blurRad="88900" dist="38100" dir="5400000" algn="t" rotWithShape="0">
+              <a:prstClr val="black">
+                <a:alpha val="40000"/>
+              </a:prstClr>
+            </a:outerShdw>
+          </a:effectLst>
+        </p:spPr>
+      </p:pic>
+      <p:sp>
+        <p:nvSpPr>
+          <p:cNvPr id="3" name="Content Placeholder 2">
+            <a:extLst>
+              <a:ext uri="{FF2B5EF4-FFF2-40B4-BE49-F238E27FC236}">
+                <a16:creationId xmlns:a16="http://schemas.microsoft.com/office/drawing/2014/main" id="{579B1D10-ACFF-4AF4-8065-8DAAAE9E735E}"/>
+              </a:ext>
+            </a:extLst>
+          </p:cNvPr>
+          <p:cNvSpPr>
+            <a:spLocks noGrp="1"/>
+          </p:cNvSpPr>
+          <p:nvPr>
+            <p:ph idx="1"/>
+          </p:nvPr>
+        </p:nvSpPr>
+        <p:spPr>
+          <a:xfrm>
+            <a:off x="5034579" y="2249487"/>
+            <a:ext cx="6012832" cy="3541714"/>
+          </a:xfrm>
+        </p:spPr>
+        <p:txBody>
+          <a:bodyPr>
+            <a:normAutofit/>
+          </a:bodyPr>
+          <a:lstStyle/>
+          <a:p>
+            <a:r>
+              <a:rPr lang="en-US" dirty="0"/>
+              <a:t>Uniform layout design handles the templating which is _</a:t>
+            </a:r>
+            <a:r>
+              <a:rPr lang="en-US" dirty="0" err="1"/>
+              <a:t>Layout.cshtml</a:t>
+            </a:r>
+            <a:endParaRPr lang="en-US" dirty="0"/>
+          </a:p>
+          <a:p>
+            <a:pPr lvl="1"/>
+            <a:r>
+              <a:rPr lang="en-US" dirty="0"/>
+              <a:t>Breaks down into Header, body, footer</a:t>
+            </a:r>
+          </a:p>
+          <a:p>
+            <a:pPr lvl="1"/>
+            <a:r>
+              <a:rPr lang="en-US" dirty="0"/>
+              <a:t>Subsequent views only render the body portion</a:t>
+            </a:r>
+          </a:p>
+          <a:p>
+            <a:pPr lvl="1"/>
+            <a:r>
+              <a:rPr lang="en-US" dirty="0"/>
+              <a:t>The </a:t>
+            </a:r>
+            <a:r>
+              <a:rPr lang="en-US" dirty="0" err="1"/>
+              <a:t>GameBoard</a:t>
+            </a:r>
+            <a:r>
+              <a:rPr lang="en-US" dirty="0"/>
+              <a:t> view uses partial views for reactive loading of data needed, opposed to loading the full page.</a:t>
+            </a:r>
+          </a:p>
+          <a:p>
+            <a:pPr lvl="1"/>
+            <a:endParaRPr lang="en-US" dirty="0"/>
+          </a:p>
+        </p:txBody>
+      </p:sp>
+    </p:spTree>
+    <p:extLst>
+      <p:ext uri="{BB962C8B-B14F-4D97-AF65-F5344CB8AC3E}">
+        <p14:creationId xmlns:p14="http://schemas.microsoft.com/office/powerpoint/2010/main" val="368632299"/>
+      </p:ext>
+    </p:extLst>
+  </p:cSld>
+  <p:clrMapOvr>
+    <a:masterClrMapping/>
+  </p:clrMapOvr>
+</p:sld>
+</file>
+
+<file path=ppt/slides/slide12.xml><?xml version="1.0" encoding="utf-8"?>
+<p:sld xmlns:a="http://schemas.openxmlformats.org/drawingml/2006/main" xmlns:r="http://schemas.openxmlformats.org/officeDocument/2006/relationships" xmlns:p="http://schemas.openxmlformats.org/presentationml/2006/main">
+  <p:cSld>
+    <p:spTree>
+      <p:nvGrpSpPr>
+        <p:cNvPr id="1" name=""/>
+        <p:cNvGrpSpPr/>
+        <p:nvPr/>
+      </p:nvGrpSpPr>
+      <p:grpSpPr>
+        <a:xfrm>
+          <a:off x="0" y="0"/>
+          <a:ext cx="0" cy="0"/>
+          <a:chOff x="0" y="0"/>
+          <a:chExt cx="0" cy="0"/>
+        </a:xfrm>
+      </p:grpSpPr>
+      <p:sp>
+        <p:nvSpPr>
+          <p:cNvPr id="2" name="Title 1">
+            <a:extLst>
+              <a:ext uri="{FF2B5EF4-FFF2-40B4-BE49-F238E27FC236}">
+                <a16:creationId xmlns:a16="http://schemas.microsoft.com/office/drawing/2014/main" id="{B5146574-9571-4349-BF67-E8ECFF0F9EBC}"/>
+              </a:ext>
+            </a:extLst>
+          </p:cNvPr>
+          <p:cNvSpPr>
+            <a:spLocks noGrp="1"/>
+          </p:cNvSpPr>
+          <p:nvPr>
+            <p:ph type="title"/>
+          </p:nvPr>
+        </p:nvSpPr>
+        <p:spPr/>
+        <p:txBody>
+          <a:bodyPr/>
+          <a:lstStyle/>
+          <a:p>
+            <a:r>
+              <a:rPr lang="en-US" dirty="0"/>
+              <a:t>Challenges</a:t>
+            </a:r>
+          </a:p>
+        </p:txBody>
+      </p:sp>
+      <p:sp>
+        <p:nvSpPr>
+          <p:cNvPr id="3" name="Content Placeholder 2">
+            <a:extLst>
+              <a:ext uri="{FF2B5EF4-FFF2-40B4-BE49-F238E27FC236}">
+                <a16:creationId xmlns:a16="http://schemas.microsoft.com/office/drawing/2014/main" id="{4C4AAFAC-805E-48F0-B3BE-8EB9E68DD93A}"/>
+              </a:ext>
+            </a:extLst>
+          </p:cNvPr>
+          <p:cNvSpPr>
+            <a:spLocks noGrp="1"/>
+          </p:cNvSpPr>
+          <p:nvPr>
+            <p:ph idx="1"/>
+          </p:nvPr>
+        </p:nvSpPr>
+        <p:spPr/>
+        <p:txBody>
+          <a:bodyPr/>
+          <a:lstStyle/>
+          <a:p>
+            <a:r>
+              <a:rPr lang="en-US" dirty="0"/>
+              <a:t>UI Styling could be improved to be more appealing</a:t>
+            </a:r>
+          </a:p>
+          <a:p>
+            <a:r>
+              <a:rPr lang="en-US" dirty="0"/>
+              <a:t>Initially we had issues where the game did not show the expected cells upon clicking a bomb.</a:t>
+            </a:r>
+          </a:p>
+          <a:p>
+            <a:r>
+              <a:rPr lang="en-US" dirty="0"/>
+              <a:t>Testing issues in browsers, no one used internet explorer</a:t>
+            </a:r>
+          </a:p>
+          <a:p>
+            <a:r>
+              <a:rPr lang="en-US" dirty="0"/>
+              <a:t>Had issues trying to secure the REST API using basic authentication</a:t>
+            </a:r>
+          </a:p>
+          <a:p>
+            <a:pPr lvl="1"/>
+            <a:r>
+              <a:rPr lang="en-US" dirty="0"/>
+              <a:t>Spent 4 – 5 hours going through read me and how </a:t>
+            </a:r>
+            <a:r>
+              <a:rPr lang="en-US" dirty="0" err="1"/>
+              <a:t>to’s</a:t>
+            </a:r>
+            <a:r>
+              <a:rPr lang="en-US" dirty="0"/>
+              <a:t> to still not have functioning authentication.</a:t>
+            </a:r>
+          </a:p>
+        </p:txBody>
+      </p:sp>
+    </p:spTree>
+    <p:extLst>
+      <p:ext uri="{BB962C8B-B14F-4D97-AF65-F5344CB8AC3E}">
+        <p14:creationId xmlns:p14="http://schemas.microsoft.com/office/powerpoint/2010/main" val="500494454"/>
+      </p:ext>
+    </p:extLst>
+  </p:cSld>
+  <p:clrMapOvr>
+    <a:masterClrMapping/>
+  </p:clrMapOvr>
+</p:sld>
+</file>
+
+<file path=ppt/slides/slide13.xml><?xml version="1.0" encoding="utf-8"?>
+<p:sld xmlns:a="http://schemas.openxmlformats.org/drawingml/2006/main" xmlns:r="http://schemas.openxmlformats.org/officeDocument/2006/relationships" xmlns:p="http://schemas.openxmlformats.org/presentationml/2006/main">
+  <p:cSld>
+    <p:spTree>
+      <p:nvGrpSpPr>
+        <p:cNvPr id="1" name=""/>
+        <p:cNvGrpSpPr/>
+        <p:nvPr/>
+      </p:nvGrpSpPr>
+      <p:grpSpPr>
+        <a:xfrm>
+          <a:off x="0" y="0"/>
+          <a:ext cx="0" cy="0"/>
+          <a:chOff x="0" y="0"/>
+          <a:chExt cx="0" cy="0"/>
+        </a:xfrm>
+      </p:grpSpPr>
+      <p:sp>
+        <p:nvSpPr>
+          <p:cNvPr id="2" name="Title 1">
+            <a:extLst>
+              <a:ext uri="{FF2B5EF4-FFF2-40B4-BE49-F238E27FC236}">
+                <a16:creationId xmlns:a16="http://schemas.microsoft.com/office/drawing/2014/main" id="{DBE86732-8C6B-417B-8E22-42B5E065DB5A}"/>
+              </a:ext>
+            </a:extLst>
+          </p:cNvPr>
+          <p:cNvSpPr>
+            <a:spLocks noGrp="1"/>
+          </p:cNvSpPr>
+          <p:nvPr>
+            <p:ph type="title"/>
+          </p:nvPr>
+        </p:nvSpPr>
+        <p:spPr/>
+        <p:txBody>
+          <a:bodyPr/>
+          <a:lstStyle/>
+          <a:p>
+            <a:r>
+              <a:rPr lang="en-US" dirty="0"/>
+              <a:t>Demo of Product</a:t>
+            </a:r>
+          </a:p>
+        </p:txBody>
+      </p:sp>
+      <p:sp>
+        <p:nvSpPr>
+          <p:cNvPr id="3" name="Content Placeholder 2">
+            <a:extLst>
+              <a:ext uri="{FF2B5EF4-FFF2-40B4-BE49-F238E27FC236}">
+                <a16:creationId xmlns:a16="http://schemas.microsoft.com/office/drawing/2014/main" id="{3969C694-45AF-443D-B288-9A9023F8D682}"/>
+              </a:ext>
+            </a:extLst>
+          </p:cNvPr>
+          <p:cNvSpPr>
+            <a:spLocks noGrp="1"/>
+          </p:cNvSpPr>
+          <p:nvPr>
+            <p:ph idx="1"/>
+          </p:nvPr>
+        </p:nvSpPr>
+        <p:spPr>
+          <a:xfrm>
+            <a:off x="9720943" y="2249487"/>
+            <a:ext cx="1326468" cy="3541714"/>
+          </a:xfrm>
+        </p:spPr>
+        <p:txBody>
+          <a:bodyPr/>
+          <a:lstStyle/>
+          <a:p>
+            <a:pPr marL="0" indent="0">
+              <a:buNone/>
+            </a:pPr>
+            <a:endParaRPr lang="en-US" dirty="0"/>
+          </a:p>
+        </p:txBody>
+      </p:sp>
+      <p:pic>
+        <p:nvPicPr>
+          <p:cNvPr id="5" name="Picture 4">
+            <a:extLst>
+              <a:ext uri="{FF2B5EF4-FFF2-40B4-BE49-F238E27FC236}">
+                <a16:creationId xmlns:a16="http://schemas.microsoft.com/office/drawing/2014/main" id="{00659258-386A-4CB8-A8FD-5066843FF6AC}"/>
+              </a:ext>
+            </a:extLst>
+          </p:cNvPr>
+          <p:cNvPicPr>
+            <a:picLocks noChangeAspect="1"/>
+          </p:cNvPicPr>
+          <p:nvPr/>
+        </p:nvPicPr>
+        <p:blipFill>
+          <a:blip r:embed="rId2"/>
+          <a:stretch>
+            <a:fillRect/>
+          </a:stretch>
+        </p:blipFill>
+        <p:spPr>
+          <a:xfrm>
+            <a:off x="3259145" y="2097088"/>
+            <a:ext cx="5057541" cy="4313785"/>
+          </a:xfrm>
+          <a:prstGeom prst="rect">
+            <a:avLst/>
+          </a:prstGeom>
+          <a:ln>
+            <a:solidFill>
+              <a:schemeClr val="tx2">
+                <a:lumMod val="60000"/>
+                <a:lumOff val="40000"/>
+              </a:schemeClr>
+            </a:solidFill>
+          </a:ln>
+        </p:spPr>
+      </p:pic>
+    </p:spTree>
+    <p:extLst>
+      <p:ext uri="{BB962C8B-B14F-4D97-AF65-F5344CB8AC3E}">
+        <p14:creationId xmlns:p14="http://schemas.microsoft.com/office/powerpoint/2010/main" val="2561391266"/>
+      </p:ext>
+    </p:extLst>
+  </p:cSld>
+  <p:clrMapOvr>
+    <a:masterClrMapping/>
+  </p:clrMapOvr>
+</p:sld>
+</file>
+
 <file path=ppt/slides/slide2.xml><?xml version="1.0" encoding="utf-8"?>
 <p:sld xmlns:a="http://schemas.openxmlformats.org/drawingml/2006/main" xmlns:r="http://schemas.openxmlformats.org/officeDocument/2006/relationships" xmlns:p="http://schemas.openxmlformats.org/presentationml/2006/main">
   <p:cSld>
@@ -12571,6 +13280,713 @@
 </file>
 
 <file path=ppt/slides/slide3.xml><?xml version="1.0" encoding="utf-8"?>
+<p:sld xmlns:a="http://schemas.openxmlformats.org/drawingml/2006/main" xmlns:r="http://schemas.openxmlformats.org/officeDocument/2006/relationships" xmlns:p="http://schemas.openxmlformats.org/presentationml/2006/main">
+  <p:cSld>
+    <p:spTree>
+      <p:nvGrpSpPr>
+        <p:cNvPr id="1" name=""/>
+        <p:cNvGrpSpPr/>
+        <p:nvPr/>
+      </p:nvGrpSpPr>
+      <p:grpSpPr>
+        <a:xfrm>
+          <a:off x="0" y="0"/>
+          <a:ext cx="0" cy="0"/>
+          <a:chOff x="0" y="0"/>
+          <a:chExt cx="0" cy="0"/>
+        </a:xfrm>
+      </p:grpSpPr>
+      <p:sp>
+        <p:nvSpPr>
+          <p:cNvPr id="2" name="Title 1">
+            <a:extLst>
+              <a:ext uri="{FF2B5EF4-FFF2-40B4-BE49-F238E27FC236}">
+                <a16:creationId xmlns:a16="http://schemas.microsoft.com/office/drawing/2014/main" id="{D2ADA7EC-080E-409D-B63C-5662EED9ADA8}"/>
+              </a:ext>
+            </a:extLst>
+          </p:cNvPr>
+          <p:cNvSpPr>
+            <a:spLocks noGrp="1"/>
+          </p:cNvSpPr>
+          <p:nvPr>
+            <p:ph type="title"/>
+          </p:nvPr>
+        </p:nvSpPr>
+        <p:spPr/>
+        <p:txBody>
+          <a:bodyPr/>
+          <a:lstStyle/>
+          <a:p>
+            <a:r>
+              <a:rPr lang="en-US" dirty="0"/>
+              <a:t>Progress of Application: milestone 2</a:t>
+            </a:r>
+          </a:p>
+        </p:txBody>
+      </p:sp>
+      <p:pic>
+        <p:nvPicPr>
+          <p:cNvPr id="1026" name="Picture 2">
+            <a:extLst>
+              <a:ext uri="{FF2B5EF4-FFF2-40B4-BE49-F238E27FC236}">
+                <a16:creationId xmlns:a16="http://schemas.microsoft.com/office/drawing/2014/main" id="{997700D1-F682-4C7C-8B4B-D270373E42CF}"/>
+              </a:ext>
+            </a:extLst>
+          </p:cNvPr>
+          <p:cNvPicPr>
+            <a:picLocks noGrp="1" noChangeAspect="1" noChangeArrowheads="1"/>
+          </p:cNvPicPr>
+          <p:nvPr>
+            <p:ph idx="1"/>
+          </p:nvPr>
+        </p:nvPicPr>
+        <p:blipFill>
+          <a:blip r:embed="rId2">
+            <a:extLst>
+              <a:ext uri="{28A0092B-C50C-407E-A947-70E740481C1C}">
+                <a14:useLocalDpi xmlns:a14="http://schemas.microsoft.com/office/drawing/2010/main" val="0"/>
+              </a:ext>
+            </a:extLst>
+          </a:blip>
+          <a:srcRect/>
+          <a:stretch>
+            <a:fillRect/>
+          </a:stretch>
+        </p:blipFill>
+        <p:spPr bwMode="auto">
+          <a:xfrm>
+            <a:off x="1234622" y="2097088"/>
+            <a:ext cx="4652632" cy="3541712"/>
+          </a:xfrm>
+          <a:prstGeom prst="rect">
+            <a:avLst/>
+          </a:prstGeom>
+          <a:noFill/>
+          <a:extLst>
+            <a:ext uri="{909E8E84-426E-40DD-AFC4-6F175D3DCCD1}">
+              <a14:hiddenFill xmlns:a14="http://schemas.microsoft.com/office/drawing/2010/main">
+                <a:solidFill>
+                  <a:srgbClr val="FFFFFF"/>
+                </a:solidFill>
+              </a14:hiddenFill>
+            </a:ext>
+          </a:extLst>
+        </p:spPr>
+      </p:pic>
+      <p:pic>
+        <p:nvPicPr>
+          <p:cNvPr id="1030" name="Picture 6">
+            <a:extLst>
+              <a:ext uri="{FF2B5EF4-FFF2-40B4-BE49-F238E27FC236}">
+                <a16:creationId xmlns:a16="http://schemas.microsoft.com/office/drawing/2014/main" id="{8B0B15FD-7893-4B04-B753-7578492F169D}"/>
+              </a:ext>
+            </a:extLst>
+          </p:cNvPr>
+          <p:cNvPicPr>
+            <a:picLocks noChangeAspect="1" noChangeArrowheads="1"/>
+          </p:cNvPicPr>
+          <p:nvPr/>
+        </p:nvPicPr>
+        <p:blipFill>
+          <a:blip r:embed="rId3">
+            <a:extLst>
+              <a:ext uri="{28A0092B-C50C-407E-A947-70E740481C1C}">
+                <a14:useLocalDpi xmlns:a14="http://schemas.microsoft.com/office/drawing/2010/main" val="0"/>
+              </a:ext>
+            </a:extLst>
+          </a:blip>
+          <a:srcRect/>
+          <a:stretch>
+            <a:fillRect/>
+          </a:stretch>
+        </p:blipFill>
+        <p:spPr bwMode="auto">
+          <a:xfrm>
+            <a:off x="6141016" y="2097088"/>
+            <a:ext cx="4652633" cy="3538622"/>
+          </a:xfrm>
+          <a:prstGeom prst="rect">
+            <a:avLst/>
+          </a:prstGeom>
+          <a:noFill/>
+          <a:extLst>
+            <a:ext uri="{909E8E84-426E-40DD-AFC4-6F175D3DCCD1}">
+              <a14:hiddenFill xmlns:a14="http://schemas.microsoft.com/office/drawing/2010/main">
+                <a:solidFill>
+                  <a:srgbClr val="FFFFFF"/>
+                </a:solidFill>
+              </a14:hiddenFill>
+            </a:ext>
+          </a:extLst>
+        </p:spPr>
+      </p:pic>
+    </p:spTree>
+    <p:extLst>
+      <p:ext uri="{BB962C8B-B14F-4D97-AF65-F5344CB8AC3E}">
+        <p14:creationId xmlns:p14="http://schemas.microsoft.com/office/powerpoint/2010/main" val="1778433257"/>
+      </p:ext>
+    </p:extLst>
+  </p:cSld>
+  <p:clrMapOvr>
+    <a:masterClrMapping/>
+  </p:clrMapOvr>
+</p:sld>
+</file>
+
+<file path=ppt/slides/slide4.xml><?xml version="1.0" encoding="utf-8"?>
+<p:sld xmlns:a="http://schemas.openxmlformats.org/drawingml/2006/main" xmlns:r="http://schemas.openxmlformats.org/officeDocument/2006/relationships" xmlns:p="http://schemas.openxmlformats.org/presentationml/2006/main">
+  <p:cSld>
+    <p:spTree>
+      <p:nvGrpSpPr>
+        <p:cNvPr id="1" name=""/>
+        <p:cNvGrpSpPr/>
+        <p:nvPr/>
+      </p:nvGrpSpPr>
+      <p:grpSpPr>
+        <a:xfrm>
+          <a:off x="0" y="0"/>
+          <a:ext cx="0" cy="0"/>
+          <a:chOff x="0" y="0"/>
+          <a:chExt cx="0" cy="0"/>
+        </a:xfrm>
+      </p:grpSpPr>
+      <p:sp>
+        <p:nvSpPr>
+          <p:cNvPr id="2" name="Title 1">
+            <a:extLst>
+              <a:ext uri="{FF2B5EF4-FFF2-40B4-BE49-F238E27FC236}">
+                <a16:creationId xmlns:a16="http://schemas.microsoft.com/office/drawing/2014/main" id="{D2ADA7EC-080E-409D-B63C-5662EED9ADA8}"/>
+              </a:ext>
+            </a:extLst>
+          </p:cNvPr>
+          <p:cNvSpPr>
+            <a:spLocks noGrp="1"/>
+          </p:cNvSpPr>
+          <p:nvPr>
+            <p:ph type="title"/>
+          </p:nvPr>
+        </p:nvSpPr>
+        <p:spPr/>
+        <p:txBody>
+          <a:bodyPr/>
+          <a:lstStyle/>
+          <a:p>
+            <a:r>
+              <a:rPr lang="en-US" dirty="0"/>
+              <a:t>Progress of Application: milestone 4</a:t>
+            </a:r>
+          </a:p>
+        </p:txBody>
+      </p:sp>
+      <p:pic>
+        <p:nvPicPr>
+          <p:cNvPr id="3074" name="Picture 2">
+            <a:extLst>
+              <a:ext uri="{FF2B5EF4-FFF2-40B4-BE49-F238E27FC236}">
+                <a16:creationId xmlns:a16="http://schemas.microsoft.com/office/drawing/2014/main" id="{ADB5799D-B4E2-40D9-9AAB-686EAAB4D913}"/>
+              </a:ext>
+            </a:extLst>
+          </p:cNvPr>
+          <p:cNvPicPr>
+            <a:picLocks noChangeAspect="1" noChangeArrowheads="1"/>
+          </p:cNvPicPr>
+          <p:nvPr/>
+        </p:nvPicPr>
+        <p:blipFill>
+          <a:blip r:embed="rId2">
+            <a:extLst>
+              <a:ext uri="{28A0092B-C50C-407E-A947-70E740481C1C}">
+                <a14:useLocalDpi xmlns:a14="http://schemas.microsoft.com/office/drawing/2010/main" val="0"/>
+              </a:ext>
+            </a:extLst>
+          </a:blip>
+          <a:srcRect/>
+          <a:stretch>
+            <a:fillRect/>
+          </a:stretch>
+        </p:blipFill>
+        <p:spPr bwMode="auto">
+          <a:xfrm>
+            <a:off x="631203" y="2399251"/>
+            <a:ext cx="3861761" cy="2931952"/>
+          </a:xfrm>
+          <a:prstGeom prst="rect">
+            <a:avLst/>
+          </a:prstGeom>
+          <a:noFill/>
+          <a:extLst>
+            <a:ext uri="{909E8E84-426E-40DD-AFC4-6F175D3DCCD1}">
+              <a14:hiddenFill xmlns:a14="http://schemas.microsoft.com/office/drawing/2010/main">
+                <a:solidFill>
+                  <a:srgbClr val="FFFFFF"/>
+                </a:solidFill>
+              </a14:hiddenFill>
+            </a:ext>
+          </a:extLst>
+        </p:spPr>
+      </p:pic>
+      <p:pic>
+        <p:nvPicPr>
+          <p:cNvPr id="3078" name="Picture 6">
+            <a:extLst>
+              <a:ext uri="{FF2B5EF4-FFF2-40B4-BE49-F238E27FC236}">
+                <a16:creationId xmlns:a16="http://schemas.microsoft.com/office/drawing/2014/main" id="{59285B67-6A18-4FE9-A8A0-3BEC4F60CCD1}"/>
+              </a:ext>
+            </a:extLst>
+          </p:cNvPr>
+          <p:cNvPicPr>
+            <a:picLocks noChangeAspect="1" noChangeArrowheads="1"/>
+          </p:cNvPicPr>
+          <p:nvPr/>
+        </p:nvPicPr>
+        <p:blipFill>
+          <a:blip r:embed="rId3">
+            <a:extLst>
+              <a:ext uri="{28A0092B-C50C-407E-A947-70E740481C1C}">
+                <a14:useLocalDpi xmlns:a14="http://schemas.microsoft.com/office/drawing/2010/main" val="0"/>
+              </a:ext>
+            </a:extLst>
+          </a:blip>
+          <a:srcRect/>
+          <a:stretch>
+            <a:fillRect/>
+          </a:stretch>
+        </p:blipFill>
+        <p:spPr bwMode="auto">
+          <a:xfrm>
+            <a:off x="7496281" y="2396605"/>
+            <a:ext cx="3763350" cy="2934598"/>
+          </a:xfrm>
+          <a:prstGeom prst="rect">
+            <a:avLst/>
+          </a:prstGeom>
+          <a:noFill/>
+          <a:extLst>
+            <a:ext uri="{909E8E84-426E-40DD-AFC4-6F175D3DCCD1}">
+              <a14:hiddenFill xmlns:a14="http://schemas.microsoft.com/office/drawing/2010/main">
+                <a:solidFill>
+                  <a:srgbClr val="FFFFFF"/>
+                </a:solidFill>
+              </a14:hiddenFill>
+            </a:ext>
+          </a:extLst>
+        </p:spPr>
+      </p:pic>
+      <p:pic>
+        <p:nvPicPr>
+          <p:cNvPr id="3080" name="Picture 8">
+            <a:extLst>
+              <a:ext uri="{FF2B5EF4-FFF2-40B4-BE49-F238E27FC236}">
+                <a16:creationId xmlns:a16="http://schemas.microsoft.com/office/drawing/2014/main" id="{319CBF7E-A09B-4A83-A4C3-CA7B24EE6FF1}"/>
+              </a:ext>
+            </a:extLst>
+          </p:cNvPr>
+          <p:cNvPicPr>
+            <a:picLocks noChangeAspect="1" noChangeArrowheads="1"/>
+          </p:cNvPicPr>
+          <p:nvPr/>
+        </p:nvPicPr>
+        <p:blipFill>
+          <a:blip r:embed="rId4">
+            <a:extLst>
+              <a:ext uri="{28A0092B-C50C-407E-A947-70E740481C1C}">
+                <a14:useLocalDpi xmlns:a14="http://schemas.microsoft.com/office/drawing/2010/main" val="0"/>
+              </a:ext>
+            </a:extLst>
+          </a:blip>
+          <a:srcRect/>
+          <a:stretch>
+            <a:fillRect/>
+          </a:stretch>
+        </p:blipFill>
+        <p:spPr bwMode="auto">
+          <a:xfrm>
+            <a:off x="4695720" y="2399251"/>
+            <a:ext cx="2653036" cy="2931952"/>
+          </a:xfrm>
+          <a:prstGeom prst="rect">
+            <a:avLst/>
+          </a:prstGeom>
+          <a:noFill/>
+          <a:extLst>
+            <a:ext uri="{909E8E84-426E-40DD-AFC4-6F175D3DCCD1}">
+              <a14:hiddenFill xmlns:a14="http://schemas.microsoft.com/office/drawing/2010/main">
+                <a:solidFill>
+                  <a:srgbClr val="FFFFFF"/>
+                </a:solidFill>
+              </a14:hiddenFill>
+            </a:ext>
+          </a:extLst>
+        </p:spPr>
+      </p:pic>
+    </p:spTree>
+    <p:extLst>
+      <p:ext uri="{BB962C8B-B14F-4D97-AF65-F5344CB8AC3E}">
+        <p14:creationId xmlns:p14="http://schemas.microsoft.com/office/powerpoint/2010/main" val="3473607640"/>
+      </p:ext>
+    </p:extLst>
+  </p:cSld>
+  <p:clrMapOvr>
+    <a:masterClrMapping/>
+  </p:clrMapOvr>
+</p:sld>
+</file>
+
+<file path=ppt/slides/slide5.xml><?xml version="1.0" encoding="utf-8"?>
+<p:sld xmlns:a="http://schemas.openxmlformats.org/drawingml/2006/main" xmlns:r="http://schemas.openxmlformats.org/officeDocument/2006/relationships" xmlns:p="http://schemas.openxmlformats.org/presentationml/2006/main">
+  <p:cSld>
+    <p:spTree>
+      <p:nvGrpSpPr>
+        <p:cNvPr id="1" name=""/>
+        <p:cNvGrpSpPr/>
+        <p:nvPr/>
+      </p:nvGrpSpPr>
+      <p:grpSpPr>
+        <a:xfrm>
+          <a:off x="0" y="0"/>
+          <a:ext cx="0" cy="0"/>
+          <a:chOff x="0" y="0"/>
+          <a:chExt cx="0" cy="0"/>
+        </a:xfrm>
+      </p:grpSpPr>
+      <p:sp>
+        <p:nvSpPr>
+          <p:cNvPr id="2" name="Title 1">
+            <a:extLst>
+              <a:ext uri="{FF2B5EF4-FFF2-40B4-BE49-F238E27FC236}">
+                <a16:creationId xmlns:a16="http://schemas.microsoft.com/office/drawing/2014/main" id="{D2ADA7EC-080E-409D-B63C-5662EED9ADA8}"/>
+              </a:ext>
+            </a:extLst>
+          </p:cNvPr>
+          <p:cNvSpPr>
+            <a:spLocks noGrp="1"/>
+          </p:cNvSpPr>
+          <p:nvPr>
+            <p:ph type="title"/>
+          </p:nvPr>
+        </p:nvSpPr>
+        <p:spPr/>
+        <p:txBody>
+          <a:bodyPr/>
+          <a:lstStyle/>
+          <a:p>
+            <a:r>
+              <a:rPr lang="en-US" dirty="0"/>
+              <a:t>Progress of Application: milestone 5</a:t>
+            </a:r>
+          </a:p>
+        </p:txBody>
+      </p:sp>
+      <p:sp>
+        <p:nvSpPr>
+          <p:cNvPr id="3" name="Content Placeholder 2">
+            <a:extLst>
+              <a:ext uri="{FF2B5EF4-FFF2-40B4-BE49-F238E27FC236}">
+                <a16:creationId xmlns:a16="http://schemas.microsoft.com/office/drawing/2014/main" id="{EAEA00A2-EF40-4D1B-9085-F2F389DBDAB7}"/>
+              </a:ext>
+            </a:extLst>
+          </p:cNvPr>
+          <p:cNvSpPr>
+            <a:spLocks noGrp="1"/>
+          </p:cNvSpPr>
+          <p:nvPr>
+            <p:ph idx="1"/>
+          </p:nvPr>
+        </p:nvSpPr>
+        <p:spPr/>
+        <p:txBody>
+          <a:bodyPr/>
+          <a:lstStyle/>
+          <a:p>
+            <a:endParaRPr lang="en-US" dirty="0"/>
+          </a:p>
+        </p:txBody>
+      </p:sp>
+      <p:pic>
+        <p:nvPicPr>
+          <p:cNvPr id="4098" name="Picture 2">
+            <a:extLst>
+              <a:ext uri="{FF2B5EF4-FFF2-40B4-BE49-F238E27FC236}">
+                <a16:creationId xmlns:a16="http://schemas.microsoft.com/office/drawing/2014/main" id="{009530CD-5298-4E7B-AF9F-0D8461F5466D}"/>
+              </a:ext>
+            </a:extLst>
+          </p:cNvPr>
+          <p:cNvPicPr>
+            <a:picLocks noChangeAspect="1" noChangeArrowheads="1"/>
+          </p:cNvPicPr>
+          <p:nvPr/>
+        </p:nvPicPr>
+        <p:blipFill>
+          <a:blip r:embed="rId2">
+            <a:extLst>
+              <a:ext uri="{28A0092B-C50C-407E-A947-70E740481C1C}">
+                <a14:useLocalDpi xmlns:a14="http://schemas.microsoft.com/office/drawing/2010/main" val="0"/>
+              </a:ext>
+            </a:extLst>
+          </a:blip>
+          <a:srcRect/>
+          <a:stretch>
+            <a:fillRect/>
+          </a:stretch>
+        </p:blipFill>
+        <p:spPr bwMode="auto">
+          <a:xfrm>
+            <a:off x="1141412" y="2247390"/>
+            <a:ext cx="4917390" cy="3837963"/>
+          </a:xfrm>
+          <a:prstGeom prst="rect">
+            <a:avLst/>
+          </a:prstGeom>
+          <a:noFill/>
+          <a:extLst>
+            <a:ext uri="{909E8E84-426E-40DD-AFC4-6F175D3DCCD1}">
+              <a14:hiddenFill xmlns:a14="http://schemas.microsoft.com/office/drawing/2010/main">
+                <a:solidFill>
+                  <a:srgbClr val="FFFFFF"/>
+                </a:solidFill>
+              </a14:hiddenFill>
+            </a:ext>
+          </a:extLst>
+        </p:spPr>
+      </p:pic>
+      <p:pic>
+        <p:nvPicPr>
+          <p:cNvPr id="4100" name="Picture 4">
+            <a:extLst>
+              <a:ext uri="{FF2B5EF4-FFF2-40B4-BE49-F238E27FC236}">
+                <a16:creationId xmlns:a16="http://schemas.microsoft.com/office/drawing/2014/main" id="{C3338E02-CC1F-471B-B061-2FF123BA210A}"/>
+              </a:ext>
+            </a:extLst>
+          </p:cNvPr>
+          <p:cNvPicPr>
+            <a:picLocks noChangeAspect="1" noChangeArrowheads="1"/>
+          </p:cNvPicPr>
+          <p:nvPr/>
+        </p:nvPicPr>
+        <p:blipFill>
+          <a:blip r:embed="rId3">
+            <a:extLst>
+              <a:ext uri="{28A0092B-C50C-407E-A947-70E740481C1C}">
+                <a14:useLocalDpi xmlns:a14="http://schemas.microsoft.com/office/drawing/2010/main" val="0"/>
+              </a:ext>
+            </a:extLst>
+          </a:blip>
+          <a:srcRect/>
+          <a:stretch>
+            <a:fillRect/>
+          </a:stretch>
+        </p:blipFill>
+        <p:spPr bwMode="auto">
+          <a:xfrm>
+            <a:off x="6419810" y="2247390"/>
+            <a:ext cx="4917389" cy="3838656"/>
+          </a:xfrm>
+          <a:prstGeom prst="rect">
+            <a:avLst/>
+          </a:prstGeom>
+          <a:noFill/>
+          <a:extLst>
+            <a:ext uri="{909E8E84-426E-40DD-AFC4-6F175D3DCCD1}">
+              <a14:hiddenFill xmlns:a14="http://schemas.microsoft.com/office/drawing/2010/main">
+                <a:solidFill>
+                  <a:srgbClr val="FFFFFF"/>
+                </a:solidFill>
+              </a14:hiddenFill>
+            </a:ext>
+          </a:extLst>
+        </p:spPr>
+      </p:pic>
+    </p:spTree>
+    <p:extLst>
+      <p:ext uri="{BB962C8B-B14F-4D97-AF65-F5344CB8AC3E}">
+        <p14:creationId xmlns:p14="http://schemas.microsoft.com/office/powerpoint/2010/main" val="3276410088"/>
+      </p:ext>
+    </p:extLst>
+  </p:cSld>
+  <p:clrMapOvr>
+    <a:masterClrMapping/>
+  </p:clrMapOvr>
+</p:sld>
+</file>
+
+<file path=ppt/slides/slide6.xml><?xml version="1.0" encoding="utf-8"?>
+<p:sld xmlns:a="http://schemas.openxmlformats.org/drawingml/2006/main" xmlns:r="http://schemas.openxmlformats.org/officeDocument/2006/relationships" xmlns:p="http://schemas.openxmlformats.org/presentationml/2006/main">
+  <p:cSld>
+    <p:spTree>
+      <p:nvGrpSpPr>
+        <p:cNvPr id="1" name=""/>
+        <p:cNvGrpSpPr/>
+        <p:nvPr/>
+      </p:nvGrpSpPr>
+      <p:grpSpPr>
+        <a:xfrm>
+          <a:off x="0" y="0"/>
+          <a:ext cx="0" cy="0"/>
+          <a:chOff x="0" y="0"/>
+          <a:chExt cx="0" cy="0"/>
+        </a:xfrm>
+      </p:grpSpPr>
+      <p:sp>
+        <p:nvSpPr>
+          <p:cNvPr id="2" name="Title 1">
+            <a:extLst>
+              <a:ext uri="{FF2B5EF4-FFF2-40B4-BE49-F238E27FC236}">
+                <a16:creationId xmlns:a16="http://schemas.microsoft.com/office/drawing/2014/main" id="{D2ADA7EC-080E-409D-B63C-5662EED9ADA8}"/>
+              </a:ext>
+            </a:extLst>
+          </p:cNvPr>
+          <p:cNvSpPr>
+            <a:spLocks noGrp="1"/>
+          </p:cNvSpPr>
+          <p:nvPr>
+            <p:ph type="title"/>
+          </p:nvPr>
+        </p:nvSpPr>
+        <p:spPr/>
+        <p:txBody>
+          <a:bodyPr/>
+          <a:lstStyle/>
+          <a:p>
+            <a:r>
+              <a:rPr lang="en-US" dirty="0"/>
+              <a:t>Progress of Application: milestone 5</a:t>
+            </a:r>
+          </a:p>
+        </p:txBody>
+      </p:sp>
+      <p:sp>
+        <p:nvSpPr>
+          <p:cNvPr id="3" name="Content Placeholder 2">
+            <a:extLst>
+              <a:ext uri="{FF2B5EF4-FFF2-40B4-BE49-F238E27FC236}">
+                <a16:creationId xmlns:a16="http://schemas.microsoft.com/office/drawing/2014/main" id="{08D7FB92-CB7A-4CD0-B825-5897A58462BA}"/>
+              </a:ext>
+            </a:extLst>
+          </p:cNvPr>
+          <p:cNvSpPr>
+            <a:spLocks noGrp="1"/>
+          </p:cNvSpPr>
+          <p:nvPr>
+            <p:ph idx="1"/>
+          </p:nvPr>
+        </p:nvSpPr>
+        <p:spPr/>
+        <p:txBody>
+          <a:bodyPr/>
+          <a:lstStyle/>
+          <a:p>
+            <a:endParaRPr lang="en-US" dirty="0"/>
+          </a:p>
+        </p:txBody>
+      </p:sp>
+      <p:pic>
+        <p:nvPicPr>
+          <p:cNvPr id="2050" name="Picture 2">
+            <a:extLst>
+              <a:ext uri="{FF2B5EF4-FFF2-40B4-BE49-F238E27FC236}">
+                <a16:creationId xmlns:a16="http://schemas.microsoft.com/office/drawing/2014/main" id="{FB7C654E-AE5C-4DBB-914C-BCBB76A62B7A}"/>
+              </a:ext>
+            </a:extLst>
+          </p:cNvPr>
+          <p:cNvPicPr>
+            <a:picLocks noChangeAspect="1" noChangeArrowheads="1"/>
+          </p:cNvPicPr>
+          <p:nvPr/>
+        </p:nvPicPr>
+        <p:blipFill>
+          <a:blip r:embed="rId2">
+            <a:extLst>
+              <a:ext uri="{28A0092B-C50C-407E-A947-70E740481C1C}">
+                <a14:useLocalDpi xmlns:a14="http://schemas.microsoft.com/office/drawing/2010/main" val="0"/>
+              </a:ext>
+            </a:extLst>
+          </a:blip>
+          <a:srcRect/>
+          <a:stretch>
+            <a:fillRect/>
+          </a:stretch>
+        </p:blipFill>
+        <p:spPr bwMode="auto">
+          <a:xfrm>
+            <a:off x="1141412" y="2249486"/>
+            <a:ext cx="5326500" cy="3552097"/>
+          </a:xfrm>
+          <a:prstGeom prst="rect">
+            <a:avLst/>
+          </a:prstGeom>
+          <a:noFill/>
+          <a:extLst>
+            <a:ext uri="{909E8E84-426E-40DD-AFC4-6F175D3DCCD1}">
+              <a14:hiddenFill xmlns:a14="http://schemas.microsoft.com/office/drawing/2010/main">
+                <a:solidFill>
+                  <a:srgbClr val="FFFFFF"/>
+                </a:solidFill>
+              </a14:hiddenFill>
+            </a:ext>
+          </a:extLst>
+        </p:spPr>
+      </p:pic>
+      <p:pic>
+        <p:nvPicPr>
+          <p:cNvPr id="2052" name="Picture 4">
+            <a:extLst>
+              <a:ext uri="{FF2B5EF4-FFF2-40B4-BE49-F238E27FC236}">
+                <a16:creationId xmlns:a16="http://schemas.microsoft.com/office/drawing/2014/main" id="{13C2DFB7-9264-4621-8E0C-9DFF0BDF6E27}"/>
+              </a:ext>
+            </a:extLst>
+          </p:cNvPr>
+          <p:cNvPicPr>
+            <a:picLocks noChangeAspect="1" noChangeArrowheads="1"/>
+          </p:cNvPicPr>
+          <p:nvPr/>
+        </p:nvPicPr>
+        <p:blipFill>
+          <a:blip r:embed="rId3">
+            <a:extLst>
+              <a:ext uri="{28A0092B-C50C-407E-A947-70E740481C1C}">
+                <a14:useLocalDpi xmlns:a14="http://schemas.microsoft.com/office/drawing/2010/main" val="0"/>
+              </a:ext>
+            </a:extLst>
+          </a:blip>
+          <a:srcRect/>
+          <a:stretch>
+            <a:fillRect/>
+          </a:stretch>
+        </p:blipFill>
+        <p:spPr bwMode="auto">
+          <a:xfrm>
+            <a:off x="6707204" y="2249486"/>
+            <a:ext cx="4441766" cy="3552097"/>
+          </a:xfrm>
+          <a:prstGeom prst="rect">
+            <a:avLst/>
+          </a:prstGeom>
+          <a:noFill/>
+          <a:extLst>
+            <a:ext uri="{909E8E84-426E-40DD-AFC4-6F175D3DCCD1}">
+              <a14:hiddenFill xmlns:a14="http://schemas.microsoft.com/office/drawing/2010/main">
+                <a:solidFill>
+                  <a:srgbClr val="FFFFFF"/>
+                </a:solidFill>
+              </a14:hiddenFill>
+            </a:ext>
+          </a:extLst>
+        </p:spPr>
+      </p:pic>
+    </p:spTree>
+    <p:extLst>
+      <p:ext uri="{BB962C8B-B14F-4D97-AF65-F5344CB8AC3E}">
+        <p14:creationId xmlns:p14="http://schemas.microsoft.com/office/powerpoint/2010/main" val="314537024"/>
+      </p:ext>
+    </p:extLst>
+  </p:cSld>
+  <p:clrMapOvr>
+    <a:masterClrMapping/>
+  </p:clrMapOvr>
+</p:sld>
+</file>
+
+<file path=ppt/slides/slide7.xml><?xml version="1.0" encoding="utf-8"?>
 <p:sld xmlns:a="http://schemas.openxmlformats.org/drawingml/2006/main" xmlns:r="http://schemas.openxmlformats.org/officeDocument/2006/relationships" xmlns:p="http://schemas.openxmlformats.org/presentationml/2006/main">
   <p:cSld>
     <p:spTree>
@@ -12662,7 +14078,7 @@
 </p:sld>
 </file>
 
-<file path=ppt/slides/slide4.xml><?xml version="1.0" encoding="utf-8"?>
+<file path=ppt/slides/slide8.xml><?xml version="1.0" encoding="utf-8"?>
 <p:sld xmlns:a="http://schemas.openxmlformats.org/drawingml/2006/main" xmlns:r="http://schemas.openxmlformats.org/officeDocument/2006/relationships" xmlns:p="http://schemas.openxmlformats.org/presentationml/2006/main">
   <p:cSld>
     <p:spTree>
@@ -12756,7 +14172,7 @@
 </p:sld>
 </file>
 
-<file path=ppt/slides/slide5.xml><?xml version="1.0" encoding="utf-8"?>
+<file path=ppt/slides/slide9.xml><?xml version="1.0" encoding="utf-8"?>
 <p:sld xmlns:a="http://schemas.openxmlformats.org/drawingml/2006/main" xmlns:r="http://schemas.openxmlformats.org/officeDocument/2006/relationships" xmlns:p="http://schemas.openxmlformats.org/presentationml/2006/main">
   <p:cSld>
     <p:bg>
@@ -13040,711 +14456,6 @@
     <p:extLst>
       <p:ext uri="{BB962C8B-B14F-4D97-AF65-F5344CB8AC3E}">
         <p14:creationId xmlns:p14="http://schemas.microsoft.com/office/powerpoint/2010/main" val="10534117"/>
-      </p:ext>
-    </p:extLst>
-  </p:cSld>
-  <p:clrMapOvr>
-    <a:masterClrMapping/>
-  </p:clrMapOvr>
-</p:sld>
-</file>
-
-<file path=ppt/slides/slide6.xml><?xml version="1.0" encoding="utf-8"?>
-<p:sld xmlns:a="http://schemas.openxmlformats.org/drawingml/2006/main" xmlns:r="http://schemas.openxmlformats.org/officeDocument/2006/relationships" xmlns:p="http://schemas.openxmlformats.org/presentationml/2006/main">
-  <p:cSld>
-    <p:bg>
-      <p:bgPr>
-        <a:blipFill>
-          <a:blip r:embed="rId2">
-            <a:duotone>
-              <a:schemeClr val="bg2">
-                <a:shade val="48000"/>
-                <a:hueMod val="106000"/>
-                <a:satMod val="140000"/>
-                <a:lumMod val="42000"/>
-              </a:schemeClr>
-              <a:schemeClr val="bg2">
-                <a:tint val="98000"/>
-                <a:hueMod val="92000"/>
-                <a:satMod val="220000"/>
-                <a:lumMod val="90000"/>
-              </a:schemeClr>
-            </a:duotone>
-          </a:blip>
-          <a:stretch/>
-        </a:blipFill>
-        <a:effectLst/>
-      </p:bgPr>
-    </p:bg>
-    <p:spTree>
-      <p:nvGrpSpPr>
-        <p:cNvPr id="1" name=""/>
-        <p:cNvGrpSpPr/>
-        <p:nvPr/>
-      </p:nvGrpSpPr>
-      <p:grpSpPr>
-        <a:xfrm>
-          <a:off x="0" y="0"/>
-          <a:ext cx="0" cy="0"/>
-          <a:chOff x="0" y="0"/>
-          <a:chExt cx="0" cy="0"/>
-        </a:xfrm>
-      </p:grpSpPr>
-      <p:sp>
-        <p:nvSpPr>
-          <p:cNvPr id="2" name="Title 1">
-            <a:extLst>
-              <a:ext uri="{FF2B5EF4-FFF2-40B4-BE49-F238E27FC236}">
-                <a16:creationId xmlns:a16="http://schemas.microsoft.com/office/drawing/2014/main" id="{57C3DCF6-FD03-420A-BE13-C59CB22ED280}"/>
-              </a:ext>
-            </a:extLst>
-          </p:cNvPr>
-          <p:cNvSpPr>
-            <a:spLocks noGrp="1"/>
-          </p:cNvSpPr>
-          <p:nvPr>
-            <p:ph type="title"/>
-          </p:nvPr>
-        </p:nvSpPr>
-        <p:spPr>
-          <a:xfrm>
-            <a:off x="1141413" y="618518"/>
-            <a:ext cx="9905998" cy="1478570"/>
-          </a:xfrm>
-        </p:spPr>
-        <p:txBody>
-          <a:bodyPr>
-            <a:normAutofit/>
-          </a:bodyPr>
-          <a:lstStyle/>
-          <a:p>
-            <a:r>
-              <a:rPr lang="en-US" dirty="0"/>
-              <a:t>Functionality: Controllers and Services</a:t>
-            </a:r>
-          </a:p>
-        </p:txBody>
-      </p:sp>
-      <p:pic>
-        <p:nvPicPr>
-          <p:cNvPr id="7" name="Picture 6">
-            <a:extLst>
-              <a:ext uri="{FF2B5EF4-FFF2-40B4-BE49-F238E27FC236}">
-                <a16:creationId xmlns:a16="http://schemas.microsoft.com/office/drawing/2014/main" id="{FD42F8AB-6762-4399-8E9B-E8AF5BCA0D08}"/>
-              </a:ext>
-            </a:extLst>
-          </p:cNvPr>
-          <p:cNvPicPr>
-            <a:picLocks noChangeAspect="1"/>
-          </p:cNvPicPr>
-          <p:nvPr/>
-        </p:nvPicPr>
-        <p:blipFill>
-          <a:blip r:embed="rId3"/>
-          <a:stretch>
-            <a:fillRect/>
-          </a:stretch>
-        </p:blipFill>
-        <p:spPr>
-          <a:xfrm>
-            <a:off x="1141413" y="3574551"/>
-            <a:ext cx="3494597" cy="2365574"/>
-          </a:xfrm>
-          <a:prstGeom prst="round2DiagRect">
-            <a:avLst>
-              <a:gd name="adj1" fmla="val 5608"/>
-              <a:gd name="adj2" fmla="val 0"/>
-            </a:avLst>
-          </a:prstGeom>
-          <a:ln w="19050" cap="sq">
-            <a:solidFill>
-              <a:schemeClr val="tx2">
-                <a:lumMod val="60000"/>
-                <a:lumOff val="40000"/>
-                <a:alpha val="60000"/>
-              </a:schemeClr>
-            </a:solidFill>
-            <a:miter lim="800000"/>
-          </a:ln>
-          <a:effectLst>
-            <a:outerShdw blurRad="88900" dist="38100" dir="5400000" algn="t" rotWithShape="0">
-              <a:prstClr val="black">
-                <a:alpha val="40000"/>
-              </a:prstClr>
-            </a:outerShdw>
-          </a:effectLst>
-        </p:spPr>
-      </p:pic>
-      <p:pic>
-        <p:nvPicPr>
-          <p:cNvPr id="5" name="Picture 4">
-            <a:extLst>
-              <a:ext uri="{FF2B5EF4-FFF2-40B4-BE49-F238E27FC236}">
-                <a16:creationId xmlns:a16="http://schemas.microsoft.com/office/drawing/2014/main" id="{B0B47018-B583-425E-9FAB-0DCA3130BD9A}"/>
-              </a:ext>
-            </a:extLst>
-          </p:cNvPr>
-          <p:cNvPicPr>
-            <a:picLocks noChangeAspect="1"/>
-          </p:cNvPicPr>
-          <p:nvPr/>
-        </p:nvPicPr>
-        <p:blipFill>
-          <a:blip r:embed="rId4"/>
-          <a:stretch>
-            <a:fillRect/>
-          </a:stretch>
-        </p:blipFill>
-        <p:spPr>
-          <a:xfrm>
-            <a:off x="1141413" y="1961015"/>
-            <a:ext cx="3494597" cy="1372111"/>
-          </a:xfrm>
-          <a:prstGeom prst="round2DiagRect">
-            <a:avLst>
-              <a:gd name="adj1" fmla="val 5608"/>
-              <a:gd name="adj2" fmla="val 0"/>
-            </a:avLst>
-          </a:prstGeom>
-          <a:ln w="19050" cap="sq">
-            <a:solidFill>
-              <a:schemeClr val="tx2">
-                <a:lumMod val="60000"/>
-                <a:lumOff val="40000"/>
-                <a:alpha val="60000"/>
-              </a:schemeClr>
-            </a:solidFill>
-            <a:miter lim="800000"/>
-          </a:ln>
-          <a:effectLst>
-            <a:outerShdw blurRad="88900" dist="38100" dir="5400000" algn="t" rotWithShape="0">
-              <a:prstClr val="black">
-                <a:alpha val="40000"/>
-              </a:prstClr>
-            </a:outerShdw>
-          </a:effectLst>
-        </p:spPr>
-      </p:pic>
-      <p:sp>
-        <p:nvSpPr>
-          <p:cNvPr id="3" name="Content Placeholder 2">
-            <a:extLst>
-              <a:ext uri="{FF2B5EF4-FFF2-40B4-BE49-F238E27FC236}">
-                <a16:creationId xmlns:a16="http://schemas.microsoft.com/office/drawing/2014/main" id="{F81A2028-62D2-4423-9164-38E85E239A46}"/>
-              </a:ext>
-            </a:extLst>
-          </p:cNvPr>
-          <p:cNvSpPr>
-            <a:spLocks noGrp="1"/>
-          </p:cNvSpPr>
-          <p:nvPr>
-            <p:ph idx="1"/>
-          </p:nvPr>
-        </p:nvSpPr>
-        <p:spPr>
-          <a:xfrm>
-            <a:off x="5034579" y="2019300"/>
-            <a:ext cx="6012832" cy="3771901"/>
-          </a:xfrm>
-        </p:spPr>
-        <p:txBody>
-          <a:bodyPr>
-            <a:normAutofit/>
-          </a:bodyPr>
-          <a:lstStyle/>
-          <a:p>
-            <a:r>
-              <a:rPr lang="en-US" dirty="0"/>
-              <a:t>Controllers receive request to an action which handles view selection and data validation.</a:t>
-            </a:r>
-          </a:p>
-          <a:p>
-            <a:pPr lvl="1"/>
-            <a:r>
-              <a:rPr lang="en-US" dirty="0"/>
-              <a:t>Models have annotations which denote which fields must be filled out controller verifies there was not a failure in the given data in a POST.</a:t>
-            </a:r>
-          </a:p>
-          <a:p>
-            <a:pPr lvl="1"/>
-            <a:r>
-              <a:rPr lang="en-US" dirty="0"/>
-              <a:t>Model is retrieved via Services and then passed to views</a:t>
-            </a:r>
-          </a:p>
-          <a:p>
-            <a:r>
-              <a:rPr lang="en-US" dirty="0"/>
-              <a:t>Services handle most of the business logic</a:t>
-            </a:r>
-          </a:p>
-        </p:txBody>
-      </p:sp>
-    </p:spTree>
-    <p:extLst>
-      <p:ext uri="{BB962C8B-B14F-4D97-AF65-F5344CB8AC3E}">
-        <p14:creationId xmlns:p14="http://schemas.microsoft.com/office/powerpoint/2010/main" val="4125134401"/>
-      </p:ext>
-    </p:extLst>
-  </p:cSld>
-  <p:clrMapOvr>
-    <a:masterClrMapping/>
-  </p:clrMapOvr>
-</p:sld>
-</file>
-
-<file path=ppt/slides/slide7.xml><?xml version="1.0" encoding="utf-8"?>
-<p:sld xmlns:a="http://schemas.openxmlformats.org/drawingml/2006/main" xmlns:r="http://schemas.openxmlformats.org/officeDocument/2006/relationships" xmlns:p="http://schemas.openxmlformats.org/presentationml/2006/main">
-  <p:cSld>
-    <p:bg>
-      <p:bgPr>
-        <a:blipFill>
-          <a:blip r:embed="rId2">
-            <a:duotone>
-              <a:schemeClr val="bg2">
-                <a:shade val="48000"/>
-                <a:hueMod val="106000"/>
-                <a:satMod val="140000"/>
-                <a:lumMod val="42000"/>
-              </a:schemeClr>
-              <a:schemeClr val="bg2">
-                <a:tint val="98000"/>
-                <a:hueMod val="92000"/>
-                <a:satMod val="220000"/>
-                <a:lumMod val="90000"/>
-              </a:schemeClr>
-            </a:duotone>
-          </a:blip>
-          <a:stretch/>
-        </a:blipFill>
-        <a:effectLst/>
-      </p:bgPr>
-    </p:bg>
-    <p:spTree>
-      <p:nvGrpSpPr>
-        <p:cNvPr id="1" name=""/>
-        <p:cNvGrpSpPr/>
-        <p:nvPr/>
-      </p:nvGrpSpPr>
-      <p:grpSpPr>
-        <a:xfrm>
-          <a:off x="0" y="0"/>
-          <a:ext cx="0" cy="0"/>
-          <a:chOff x="0" y="0"/>
-          <a:chExt cx="0" cy="0"/>
-        </a:xfrm>
-      </p:grpSpPr>
-      <p:sp>
-        <p:nvSpPr>
-          <p:cNvPr id="2" name="Title 1">
-            <a:extLst>
-              <a:ext uri="{FF2B5EF4-FFF2-40B4-BE49-F238E27FC236}">
-                <a16:creationId xmlns:a16="http://schemas.microsoft.com/office/drawing/2014/main" id="{5810C46C-D346-4377-96C3-5319D6099031}"/>
-              </a:ext>
-            </a:extLst>
-          </p:cNvPr>
-          <p:cNvSpPr>
-            <a:spLocks noGrp="1"/>
-          </p:cNvSpPr>
-          <p:nvPr>
-            <p:ph type="title"/>
-          </p:nvPr>
-        </p:nvSpPr>
-        <p:spPr>
-          <a:xfrm>
-            <a:off x="1141413" y="618518"/>
-            <a:ext cx="9905998" cy="1478570"/>
-          </a:xfrm>
-        </p:spPr>
-        <p:txBody>
-          <a:bodyPr>
-            <a:normAutofit/>
-          </a:bodyPr>
-          <a:lstStyle/>
-          <a:p>
-            <a:pPr algn="ctr"/>
-            <a:r>
-              <a:rPr lang="en-US" dirty="0"/>
-              <a:t>Functionality: Layout and Views</a:t>
-            </a:r>
-            <a:endParaRPr lang="en-US"/>
-          </a:p>
-        </p:txBody>
-      </p:sp>
-      <p:pic>
-        <p:nvPicPr>
-          <p:cNvPr id="5" name="Picture 4">
-            <a:extLst>
-              <a:ext uri="{FF2B5EF4-FFF2-40B4-BE49-F238E27FC236}">
-                <a16:creationId xmlns:a16="http://schemas.microsoft.com/office/drawing/2014/main" id="{8C4A0054-39FC-4064-BDE9-F3C42D087727}"/>
-              </a:ext>
-            </a:extLst>
-          </p:cNvPr>
-          <p:cNvPicPr>
-            <a:picLocks noChangeAspect="1"/>
-          </p:cNvPicPr>
-          <p:nvPr/>
-        </p:nvPicPr>
-        <p:blipFill rotWithShape="1">
-          <a:blip r:embed="rId3"/>
-          <a:srcRect r="2748"/>
-          <a:stretch/>
-        </p:blipFill>
-        <p:spPr>
-          <a:xfrm>
-            <a:off x="1141411" y="2249487"/>
-            <a:ext cx="3494597" cy="3549650"/>
-          </a:xfrm>
-          <a:prstGeom prst="round2DiagRect">
-            <a:avLst>
-              <a:gd name="adj1" fmla="val 5608"/>
-              <a:gd name="adj2" fmla="val 0"/>
-            </a:avLst>
-          </a:prstGeom>
-          <a:ln w="19050" cap="sq">
-            <a:solidFill>
-              <a:schemeClr val="tx2">
-                <a:lumMod val="60000"/>
-                <a:lumOff val="40000"/>
-                <a:alpha val="60000"/>
-              </a:schemeClr>
-            </a:solidFill>
-            <a:miter lim="800000"/>
-          </a:ln>
-          <a:effectLst>
-            <a:outerShdw blurRad="88900" dist="38100" dir="5400000" algn="t" rotWithShape="0">
-              <a:prstClr val="black">
-                <a:alpha val="40000"/>
-              </a:prstClr>
-            </a:outerShdw>
-          </a:effectLst>
-        </p:spPr>
-      </p:pic>
-      <p:sp>
-        <p:nvSpPr>
-          <p:cNvPr id="3" name="Content Placeholder 2">
-            <a:extLst>
-              <a:ext uri="{FF2B5EF4-FFF2-40B4-BE49-F238E27FC236}">
-                <a16:creationId xmlns:a16="http://schemas.microsoft.com/office/drawing/2014/main" id="{579B1D10-ACFF-4AF4-8065-8DAAAE9E735E}"/>
-              </a:ext>
-            </a:extLst>
-          </p:cNvPr>
-          <p:cNvSpPr>
-            <a:spLocks noGrp="1"/>
-          </p:cNvSpPr>
-          <p:nvPr>
-            <p:ph idx="1"/>
-          </p:nvPr>
-        </p:nvSpPr>
-        <p:spPr>
-          <a:xfrm>
-            <a:off x="5034579" y="2249487"/>
-            <a:ext cx="6012832" cy="3541714"/>
-          </a:xfrm>
-        </p:spPr>
-        <p:txBody>
-          <a:bodyPr>
-            <a:normAutofit/>
-          </a:bodyPr>
-          <a:lstStyle/>
-          <a:p>
-            <a:r>
-              <a:rPr lang="en-US" dirty="0"/>
-              <a:t>Uniform layout design handles the templating which is _</a:t>
-            </a:r>
-            <a:r>
-              <a:rPr lang="en-US" dirty="0" err="1"/>
-              <a:t>Layout.cshtml</a:t>
-            </a:r>
-            <a:endParaRPr lang="en-US" dirty="0"/>
-          </a:p>
-          <a:p>
-            <a:pPr lvl="1"/>
-            <a:r>
-              <a:rPr lang="en-US" dirty="0"/>
-              <a:t>Breaks down into Header, body, footer</a:t>
-            </a:r>
-          </a:p>
-          <a:p>
-            <a:pPr lvl="1"/>
-            <a:r>
-              <a:rPr lang="en-US" dirty="0"/>
-              <a:t>Subsequent views only render the body portion</a:t>
-            </a:r>
-          </a:p>
-          <a:p>
-            <a:pPr lvl="1"/>
-            <a:r>
-              <a:rPr lang="en-US" dirty="0"/>
-              <a:t>The </a:t>
-            </a:r>
-            <a:r>
-              <a:rPr lang="en-US" dirty="0" err="1"/>
-              <a:t>GameBoard</a:t>
-            </a:r>
-            <a:r>
-              <a:rPr lang="en-US" dirty="0"/>
-              <a:t> view uses partial views for reactive loading of data needed, opposed to loading the full page.</a:t>
-            </a:r>
-          </a:p>
-          <a:p>
-            <a:pPr lvl="1"/>
-            <a:endParaRPr lang="en-US" dirty="0"/>
-          </a:p>
-        </p:txBody>
-      </p:sp>
-    </p:spTree>
-    <p:extLst>
-      <p:ext uri="{BB962C8B-B14F-4D97-AF65-F5344CB8AC3E}">
-        <p14:creationId xmlns:p14="http://schemas.microsoft.com/office/powerpoint/2010/main" val="368632299"/>
-      </p:ext>
-    </p:extLst>
-  </p:cSld>
-  <p:clrMapOvr>
-    <a:masterClrMapping/>
-  </p:clrMapOvr>
-</p:sld>
-</file>
-
-<file path=ppt/slides/slide8.xml><?xml version="1.0" encoding="utf-8"?>
-<p:sld xmlns:a="http://schemas.openxmlformats.org/drawingml/2006/main" xmlns:r="http://schemas.openxmlformats.org/officeDocument/2006/relationships" xmlns:p="http://schemas.openxmlformats.org/presentationml/2006/main">
-  <p:cSld>
-    <p:spTree>
-      <p:nvGrpSpPr>
-        <p:cNvPr id="1" name=""/>
-        <p:cNvGrpSpPr/>
-        <p:nvPr/>
-      </p:nvGrpSpPr>
-      <p:grpSpPr>
-        <a:xfrm>
-          <a:off x="0" y="0"/>
-          <a:ext cx="0" cy="0"/>
-          <a:chOff x="0" y="0"/>
-          <a:chExt cx="0" cy="0"/>
-        </a:xfrm>
-      </p:grpSpPr>
-      <p:sp>
-        <p:nvSpPr>
-          <p:cNvPr id="2" name="Title 1">
-            <a:extLst>
-              <a:ext uri="{FF2B5EF4-FFF2-40B4-BE49-F238E27FC236}">
-                <a16:creationId xmlns:a16="http://schemas.microsoft.com/office/drawing/2014/main" id="{B5146574-9571-4349-BF67-E8ECFF0F9EBC}"/>
-              </a:ext>
-            </a:extLst>
-          </p:cNvPr>
-          <p:cNvSpPr>
-            <a:spLocks noGrp="1"/>
-          </p:cNvSpPr>
-          <p:nvPr>
-            <p:ph type="title"/>
-          </p:nvPr>
-        </p:nvSpPr>
-        <p:spPr/>
-        <p:txBody>
-          <a:bodyPr/>
-          <a:lstStyle/>
-          <a:p>
-            <a:r>
-              <a:rPr lang="en-US" dirty="0"/>
-              <a:t>Challenges</a:t>
-            </a:r>
-          </a:p>
-        </p:txBody>
-      </p:sp>
-      <p:sp>
-        <p:nvSpPr>
-          <p:cNvPr id="3" name="Content Placeholder 2">
-            <a:extLst>
-              <a:ext uri="{FF2B5EF4-FFF2-40B4-BE49-F238E27FC236}">
-                <a16:creationId xmlns:a16="http://schemas.microsoft.com/office/drawing/2014/main" id="{4C4AAFAC-805E-48F0-B3BE-8EB9E68DD93A}"/>
-              </a:ext>
-            </a:extLst>
-          </p:cNvPr>
-          <p:cNvSpPr>
-            <a:spLocks noGrp="1"/>
-          </p:cNvSpPr>
-          <p:nvPr>
-            <p:ph idx="1"/>
-          </p:nvPr>
-        </p:nvSpPr>
-        <p:spPr/>
-        <p:txBody>
-          <a:bodyPr/>
-          <a:lstStyle/>
-          <a:p>
-            <a:r>
-              <a:rPr lang="en-US" dirty="0"/>
-              <a:t>UI Styling could be improved to be more appealing</a:t>
-            </a:r>
-          </a:p>
-          <a:p>
-            <a:r>
-              <a:rPr lang="en-US" dirty="0"/>
-              <a:t>Initially we had issues where the game did not show the expected cells upon clicking a bomb.</a:t>
-            </a:r>
-          </a:p>
-          <a:p>
-            <a:r>
-              <a:rPr lang="en-US" dirty="0"/>
-              <a:t>Testing issues in browsers, no one used internet explorer</a:t>
-            </a:r>
-          </a:p>
-          <a:p>
-            <a:r>
-              <a:rPr lang="en-US" dirty="0"/>
-              <a:t>Had issues trying to secure the REST API using basic authentication</a:t>
-            </a:r>
-          </a:p>
-          <a:p>
-            <a:pPr lvl="1"/>
-            <a:r>
-              <a:rPr lang="en-US" dirty="0"/>
-              <a:t>Spent 4 – 5 hours going through read me and how </a:t>
-            </a:r>
-            <a:r>
-              <a:rPr lang="en-US" dirty="0" err="1"/>
-              <a:t>to’s</a:t>
-            </a:r>
-            <a:r>
-              <a:rPr lang="en-US" dirty="0"/>
-              <a:t> to still not have functioning authentication.</a:t>
-            </a:r>
-          </a:p>
-        </p:txBody>
-      </p:sp>
-    </p:spTree>
-    <p:extLst>
-      <p:ext uri="{BB962C8B-B14F-4D97-AF65-F5344CB8AC3E}">
-        <p14:creationId xmlns:p14="http://schemas.microsoft.com/office/powerpoint/2010/main" val="500494454"/>
-      </p:ext>
-    </p:extLst>
-  </p:cSld>
-  <p:clrMapOvr>
-    <a:masterClrMapping/>
-  </p:clrMapOvr>
-</p:sld>
-</file>
-
-<file path=ppt/slides/slide9.xml><?xml version="1.0" encoding="utf-8"?>
-<p:sld xmlns:a="http://schemas.openxmlformats.org/drawingml/2006/main" xmlns:r="http://schemas.openxmlformats.org/officeDocument/2006/relationships" xmlns:p="http://schemas.openxmlformats.org/presentationml/2006/main">
-  <p:cSld>
-    <p:spTree>
-      <p:nvGrpSpPr>
-        <p:cNvPr id="1" name=""/>
-        <p:cNvGrpSpPr/>
-        <p:nvPr/>
-      </p:nvGrpSpPr>
-      <p:grpSpPr>
-        <a:xfrm>
-          <a:off x="0" y="0"/>
-          <a:ext cx="0" cy="0"/>
-          <a:chOff x="0" y="0"/>
-          <a:chExt cx="0" cy="0"/>
-        </a:xfrm>
-      </p:grpSpPr>
-      <p:sp>
-        <p:nvSpPr>
-          <p:cNvPr id="2" name="Title 1">
-            <a:extLst>
-              <a:ext uri="{FF2B5EF4-FFF2-40B4-BE49-F238E27FC236}">
-                <a16:creationId xmlns:a16="http://schemas.microsoft.com/office/drawing/2014/main" id="{DBE86732-8C6B-417B-8E22-42B5E065DB5A}"/>
-              </a:ext>
-            </a:extLst>
-          </p:cNvPr>
-          <p:cNvSpPr>
-            <a:spLocks noGrp="1"/>
-          </p:cNvSpPr>
-          <p:nvPr>
-            <p:ph type="title"/>
-          </p:nvPr>
-        </p:nvSpPr>
-        <p:spPr/>
-        <p:txBody>
-          <a:bodyPr/>
-          <a:lstStyle/>
-          <a:p>
-            <a:r>
-              <a:rPr lang="en-US" dirty="0"/>
-              <a:t>Demo of Product</a:t>
-            </a:r>
-          </a:p>
-        </p:txBody>
-      </p:sp>
-      <p:sp>
-        <p:nvSpPr>
-          <p:cNvPr id="3" name="Content Placeholder 2">
-            <a:extLst>
-              <a:ext uri="{FF2B5EF4-FFF2-40B4-BE49-F238E27FC236}">
-                <a16:creationId xmlns:a16="http://schemas.microsoft.com/office/drawing/2014/main" id="{3969C694-45AF-443D-B288-9A9023F8D682}"/>
-              </a:ext>
-            </a:extLst>
-          </p:cNvPr>
-          <p:cNvSpPr>
-            <a:spLocks noGrp="1"/>
-          </p:cNvSpPr>
-          <p:nvPr>
-            <p:ph idx="1"/>
-          </p:nvPr>
-        </p:nvSpPr>
-        <p:spPr>
-          <a:xfrm>
-            <a:off x="9720943" y="2249487"/>
-            <a:ext cx="1326468" cy="3541714"/>
-          </a:xfrm>
-        </p:spPr>
-        <p:txBody>
-          <a:bodyPr/>
-          <a:lstStyle/>
-          <a:p>
-            <a:pPr marL="0" indent="0">
-              <a:buNone/>
-            </a:pPr>
-            <a:endParaRPr lang="en-US" dirty="0"/>
-          </a:p>
-        </p:txBody>
-      </p:sp>
-      <p:pic>
-        <p:nvPicPr>
-          <p:cNvPr id="5" name="Picture 4">
-            <a:extLst>
-              <a:ext uri="{FF2B5EF4-FFF2-40B4-BE49-F238E27FC236}">
-                <a16:creationId xmlns:a16="http://schemas.microsoft.com/office/drawing/2014/main" id="{00659258-386A-4CB8-A8FD-5066843FF6AC}"/>
-              </a:ext>
-            </a:extLst>
-          </p:cNvPr>
-          <p:cNvPicPr>
-            <a:picLocks noChangeAspect="1"/>
-          </p:cNvPicPr>
-          <p:nvPr/>
-        </p:nvPicPr>
-        <p:blipFill>
-          <a:blip r:embed="rId2"/>
-          <a:stretch>
-            <a:fillRect/>
-          </a:stretch>
-        </p:blipFill>
-        <p:spPr>
-          <a:xfrm>
-            <a:off x="3259145" y="2097088"/>
-            <a:ext cx="5057541" cy="4313785"/>
-          </a:xfrm>
-          <a:prstGeom prst="rect">
-            <a:avLst/>
-          </a:prstGeom>
-          <a:ln>
-            <a:solidFill>
-              <a:schemeClr val="tx2">
-                <a:lumMod val="60000"/>
-                <a:lumOff val="40000"/>
-              </a:schemeClr>
-            </a:solidFill>
-          </a:ln>
-        </p:spPr>
-      </p:pic>
-    </p:spTree>
-    <p:extLst>
-      <p:ext uri="{BB962C8B-B14F-4D97-AF65-F5344CB8AC3E}">
-        <p14:creationId xmlns:p14="http://schemas.microsoft.com/office/powerpoint/2010/main" val="2561391266"/>
       </p:ext>
     </p:extLst>
   </p:cSld>

</xml_diff>